<commit_message>
First attempt yp split system
</commit_message>
<xml_diff>
--- a/Documentation/ClockNet.pptx
+++ b/Documentation/ClockNet.pptx
@@ -7,9 +7,11 @@
   <p:sldIdLst>
     <p:sldId id="256" r:id="rId2"/>
     <p:sldId id="257" r:id="rId3"/>
-    <p:sldId id="258" r:id="rId4"/>
-    <p:sldId id="260" r:id="rId5"/>
-    <p:sldId id="259" r:id="rId6"/>
+    <p:sldId id="262" r:id="rId4"/>
+    <p:sldId id="258" r:id="rId5"/>
+    <p:sldId id="261" r:id="rId6"/>
+    <p:sldId id="260" r:id="rId7"/>
+    <p:sldId id="259" r:id="rId8"/>
   </p:sldIdLst>
   <p:sldSz cx="12192000" cy="6858000"/>
   <p:notesSz cx="6858000" cy="9144000"/>
@@ -265,7 +267,7 @@
           <a:p>
             <a:fld id="{BE8EC4D6-8DFC-4D31-BF3E-167B2F1ECE7E}" type="datetimeFigureOut">
               <a:rPr lang="en-SE" smtClean="0"/>
-              <a:t>2021-01-20</a:t>
+              <a:t>2021-02-28</a:t>
             </a:fld>
             <a:endParaRPr lang="en-SE"/>
           </a:p>
@@ -465,7 +467,7 @@
           <a:p>
             <a:fld id="{BE8EC4D6-8DFC-4D31-BF3E-167B2F1ECE7E}" type="datetimeFigureOut">
               <a:rPr lang="en-SE" smtClean="0"/>
-              <a:t>2021-01-20</a:t>
+              <a:t>2021-02-28</a:t>
             </a:fld>
             <a:endParaRPr lang="en-SE"/>
           </a:p>
@@ -675,7 +677,7 @@
           <a:p>
             <a:fld id="{BE8EC4D6-8DFC-4D31-BF3E-167B2F1ECE7E}" type="datetimeFigureOut">
               <a:rPr lang="en-SE" smtClean="0"/>
-              <a:t>2021-01-20</a:t>
+              <a:t>2021-02-28</a:t>
             </a:fld>
             <a:endParaRPr lang="en-SE"/>
           </a:p>
@@ -875,7 +877,7 @@
           <a:p>
             <a:fld id="{BE8EC4D6-8DFC-4D31-BF3E-167B2F1ECE7E}" type="datetimeFigureOut">
               <a:rPr lang="en-SE" smtClean="0"/>
-              <a:t>2021-01-20</a:t>
+              <a:t>2021-02-28</a:t>
             </a:fld>
             <a:endParaRPr lang="en-SE"/>
           </a:p>
@@ -1151,7 +1153,7 @@
           <a:p>
             <a:fld id="{BE8EC4D6-8DFC-4D31-BF3E-167B2F1ECE7E}" type="datetimeFigureOut">
               <a:rPr lang="en-SE" smtClean="0"/>
-              <a:t>2021-01-20</a:t>
+              <a:t>2021-02-28</a:t>
             </a:fld>
             <a:endParaRPr lang="en-SE"/>
           </a:p>
@@ -1419,7 +1421,7 @@
           <a:p>
             <a:fld id="{BE8EC4D6-8DFC-4D31-BF3E-167B2F1ECE7E}" type="datetimeFigureOut">
               <a:rPr lang="en-SE" smtClean="0"/>
-              <a:t>2021-01-20</a:t>
+              <a:t>2021-02-28</a:t>
             </a:fld>
             <a:endParaRPr lang="en-SE"/>
           </a:p>
@@ -1834,7 +1836,7 @@
           <a:p>
             <a:fld id="{BE8EC4D6-8DFC-4D31-BF3E-167B2F1ECE7E}" type="datetimeFigureOut">
               <a:rPr lang="en-SE" smtClean="0"/>
-              <a:t>2021-01-20</a:t>
+              <a:t>2021-02-28</a:t>
             </a:fld>
             <a:endParaRPr lang="en-SE"/>
           </a:p>
@@ -1976,7 +1978,7 @@
           <a:p>
             <a:fld id="{BE8EC4D6-8DFC-4D31-BF3E-167B2F1ECE7E}" type="datetimeFigureOut">
               <a:rPr lang="en-SE" smtClean="0"/>
-              <a:t>2021-01-20</a:t>
+              <a:t>2021-02-28</a:t>
             </a:fld>
             <a:endParaRPr lang="en-SE"/>
           </a:p>
@@ -2089,7 +2091,7 @@
           <a:p>
             <a:fld id="{BE8EC4D6-8DFC-4D31-BF3E-167B2F1ECE7E}" type="datetimeFigureOut">
               <a:rPr lang="en-SE" smtClean="0"/>
-              <a:t>2021-01-20</a:t>
+              <a:t>2021-02-28</a:t>
             </a:fld>
             <a:endParaRPr lang="en-SE"/>
           </a:p>
@@ -2402,7 +2404,7 @@
           <a:p>
             <a:fld id="{BE8EC4D6-8DFC-4D31-BF3E-167B2F1ECE7E}" type="datetimeFigureOut">
               <a:rPr lang="en-SE" smtClean="0"/>
-              <a:t>2021-01-20</a:t>
+              <a:t>2021-02-28</a:t>
             </a:fld>
             <a:endParaRPr lang="en-SE"/>
           </a:p>
@@ -2691,7 +2693,7 @@
           <a:p>
             <a:fld id="{BE8EC4D6-8DFC-4D31-BF3E-167B2F1ECE7E}" type="datetimeFigureOut">
               <a:rPr lang="en-SE" smtClean="0"/>
-              <a:t>2021-01-20</a:t>
+              <a:t>2021-02-28</a:t>
             </a:fld>
             <a:endParaRPr lang="en-SE"/>
           </a:p>
@@ -2934,7 +2936,7 @@
           <a:p>
             <a:fld id="{BE8EC4D6-8DFC-4D31-BF3E-167B2F1ECE7E}" type="datetimeFigureOut">
               <a:rPr lang="en-SE" smtClean="0"/>
-              <a:t>2021-01-20</a:t>
+              <a:t>2021-02-28</a:t>
             </a:fld>
             <a:endParaRPr lang="en-SE"/>
           </a:p>
@@ -4015,6 +4017,13 @@
               <a:rPr lang="en-SE" dirty="0"/>
               <a:t>Topology: Star Distribution</a:t>
             </a:r>
+            <a:br>
+              <a:rPr lang="en-SE" dirty="0"/>
+            </a:br>
+            <a:r>
+              <a:rPr lang="en-SE" dirty="0"/>
+              <a:t>Original solution</a:t>
+            </a:r>
           </a:p>
         </p:txBody>
       </p:sp>
@@ -5360,7 +5369,7 @@
     </p:spTree>
     <p:extLst>
       <p:ext uri="{BB962C8B-B14F-4D97-AF65-F5344CB8AC3E}">
-        <p14:creationId xmlns:p14="http://schemas.microsoft.com/office/powerpoint/2010/main" val="3186348832"/>
+        <p14:creationId xmlns:p14="http://schemas.microsoft.com/office/powerpoint/2010/main" val="1497203878"/>
       </p:ext>
     </p:extLst>
   </p:cSld>
@@ -5392,6 +5401,1688 @@
           <p:cNvPr id="2" name="Title 1">
             <a:extLst>
               <a:ext uri="{FF2B5EF4-FFF2-40B4-BE49-F238E27FC236}">
+                <a16:creationId xmlns:a16="http://schemas.microsoft.com/office/drawing/2014/main" id="{AF0E3A21-EA92-4943-A69B-C8BEEC506EC5}"/>
+              </a:ext>
+            </a:extLst>
+          </p:cNvPr>
+          <p:cNvSpPr>
+            <a:spLocks noGrp="1"/>
+          </p:cNvSpPr>
+          <p:nvPr>
+            <p:ph type="title"/>
+          </p:nvPr>
+        </p:nvSpPr>
+        <p:spPr/>
+        <p:txBody>
+          <a:bodyPr/>
+          <a:lstStyle/>
+          <a:p>
+            <a:r>
+              <a:rPr lang="en-SE" dirty="0"/>
+              <a:t>Topology: Star Distribution</a:t>
+            </a:r>
+            <a:br>
+              <a:rPr lang="en-SE" dirty="0"/>
+            </a:br>
+            <a:r>
+              <a:rPr lang="en-SE" dirty="0" err="1"/>
+              <a:t>Frontyard</a:t>
+            </a:r>
+            <a:r>
+              <a:rPr lang="en-SE" dirty="0"/>
+              <a:t> side</a:t>
+            </a:r>
+          </a:p>
+        </p:txBody>
+      </p:sp>
+      <p:sp>
+        <p:nvSpPr>
+          <p:cNvPr id="3" name="Rectangle 2">
+            <a:extLst>
+              <a:ext uri="{FF2B5EF4-FFF2-40B4-BE49-F238E27FC236}">
+                <a16:creationId xmlns:a16="http://schemas.microsoft.com/office/drawing/2014/main" id="{772D33C7-F15A-4328-859F-268788CDC37F}"/>
+              </a:ext>
+            </a:extLst>
+          </p:cNvPr>
+          <p:cNvSpPr/>
+          <p:nvPr/>
+        </p:nvSpPr>
+        <p:spPr>
+          <a:xfrm>
+            <a:off x="2235818" y="2550594"/>
+            <a:ext cx="914400" cy="914400"/>
+          </a:xfrm>
+          <a:prstGeom prst="rect">
+            <a:avLst/>
+          </a:prstGeom>
+          <a:solidFill>
+            <a:srgbClr val="92D050">
+              <a:alpha val="42000"/>
+            </a:srgbClr>
+          </a:solidFill>
+          <a:ln>
+            <a:solidFill>
+              <a:schemeClr val="accent1">
+                <a:shade val="50000"/>
+                <a:alpha val="86000"/>
+              </a:schemeClr>
+            </a:solidFill>
+          </a:ln>
+        </p:spPr>
+        <p:style>
+          <a:lnRef idx="2">
+            <a:schemeClr val="accent1">
+              <a:shade val="50000"/>
+            </a:schemeClr>
+          </a:lnRef>
+          <a:fillRef idx="1">
+            <a:schemeClr val="accent1"/>
+          </a:fillRef>
+          <a:effectRef idx="0">
+            <a:schemeClr val="accent1"/>
+          </a:effectRef>
+          <a:fontRef idx="minor">
+            <a:schemeClr val="lt1"/>
+          </a:fontRef>
+        </p:style>
+        <p:txBody>
+          <a:bodyPr rtlCol="0" anchor="ctr"/>
+          <a:lstStyle/>
+          <a:p>
+            <a:pPr algn="ctr"/>
+            <a:r>
+              <a:rPr lang="en-SE" sz="1200" dirty="0">
+                <a:solidFill>
+                  <a:schemeClr val="tx1"/>
+                </a:solidFill>
+              </a:rPr>
+              <a:t>Node 9</a:t>
+            </a:r>
+          </a:p>
+          <a:p>
+            <a:pPr algn="ctr"/>
+            <a:r>
+              <a:rPr lang="en-SE" sz="1200" dirty="0">
+                <a:solidFill>
+                  <a:schemeClr val="tx1"/>
+                </a:solidFill>
+              </a:rPr>
+              <a:t>Porch</a:t>
+            </a:r>
+          </a:p>
+        </p:txBody>
+      </p:sp>
+      <p:sp>
+        <p:nvSpPr>
+          <p:cNvPr id="4" name="Rectangle 3">
+            <a:extLst>
+              <a:ext uri="{FF2B5EF4-FFF2-40B4-BE49-F238E27FC236}">
+                <a16:creationId xmlns:a16="http://schemas.microsoft.com/office/drawing/2014/main" id="{22685319-BF4F-4CC2-8AD1-AF959C07D429}"/>
+              </a:ext>
+            </a:extLst>
+          </p:cNvPr>
+          <p:cNvSpPr/>
+          <p:nvPr/>
+        </p:nvSpPr>
+        <p:spPr>
+          <a:xfrm>
+            <a:off x="5064710" y="3262452"/>
+            <a:ext cx="914400" cy="914400"/>
+          </a:xfrm>
+          <a:prstGeom prst="rect">
+            <a:avLst/>
+          </a:prstGeom>
+          <a:solidFill>
+            <a:srgbClr val="92D050">
+              <a:alpha val="42000"/>
+            </a:srgbClr>
+          </a:solidFill>
+          <a:ln>
+            <a:solidFill>
+              <a:schemeClr val="accent1">
+                <a:shade val="50000"/>
+                <a:alpha val="86000"/>
+              </a:schemeClr>
+            </a:solidFill>
+          </a:ln>
+        </p:spPr>
+        <p:style>
+          <a:lnRef idx="2">
+            <a:schemeClr val="accent1">
+              <a:shade val="50000"/>
+            </a:schemeClr>
+          </a:lnRef>
+          <a:fillRef idx="1">
+            <a:schemeClr val="accent1"/>
+          </a:fillRef>
+          <a:effectRef idx="0">
+            <a:schemeClr val="accent1"/>
+          </a:effectRef>
+          <a:fontRef idx="minor">
+            <a:schemeClr val="lt1"/>
+          </a:fontRef>
+        </p:style>
+        <p:txBody>
+          <a:bodyPr rtlCol="0" anchor="ctr"/>
+          <a:lstStyle/>
+          <a:p>
+            <a:pPr algn="ctr"/>
+            <a:r>
+              <a:rPr lang="en-SE" sz="1200" dirty="0">
+                <a:solidFill>
+                  <a:schemeClr val="tx1"/>
+                </a:solidFill>
+              </a:rPr>
+              <a:t>Node 85</a:t>
+            </a:r>
+          </a:p>
+          <a:p>
+            <a:pPr algn="ctr"/>
+            <a:r>
+              <a:rPr lang="en-SE" sz="1200" dirty="0">
+                <a:solidFill>
+                  <a:schemeClr val="tx1"/>
+                </a:solidFill>
+              </a:rPr>
+              <a:t>Node Id = 1</a:t>
+            </a:r>
+          </a:p>
+          <a:p>
+            <a:pPr algn="ctr"/>
+            <a:r>
+              <a:rPr lang="en-SE" sz="1200" dirty="0">
+                <a:solidFill>
+                  <a:schemeClr val="tx1"/>
+                </a:solidFill>
+              </a:rPr>
+              <a:t>Patio</a:t>
+            </a:r>
+          </a:p>
+        </p:txBody>
+      </p:sp>
+      <p:sp>
+        <p:nvSpPr>
+          <p:cNvPr id="5" name="Rectangle 4">
+            <a:extLst>
+              <a:ext uri="{FF2B5EF4-FFF2-40B4-BE49-F238E27FC236}">
+                <a16:creationId xmlns:a16="http://schemas.microsoft.com/office/drawing/2014/main" id="{403C9F06-3E31-43A4-8FAC-04BA9BE8828D}"/>
+              </a:ext>
+            </a:extLst>
+          </p:cNvPr>
+          <p:cNvSpPr/>
+          <p:nvPr/>
+        </p:nvSpPr>
+        <p:spPr>
+          <a:xfrm>
+            <a:off x="7893602" y="3262452"/>
+            <a:ext cx="914400" cy="914400"/>
+          </a:xfrm>
+          <a:prstGeom prst="rect">
+            <a:avLst/>
+          </a:prstGeom>
+          <a:solidFill>
+            <a:srgbClr val="92D050">
+              <a:alpha val="42000"/>
+            </a:srgbClr>
+          </a:solidFill>
+          <a:ln>
+            <a:solidFill>
+              <a:schemeClr val="accent1">
+                <a:shade val="50000"/>
+                <a:alpha val="86000"/>
+              </a:schemeClr>
+            </a:solidFill>
+          </a:ln>
+        </p:spPr>
+        <p:style>
+          <a:lnRef idx="2">
+            <a:schemeClr val="accent1">
+              <a:shade val="50000"/>
+            </a:schemeClr>
+          </a:lnRef>
+          <a:fillRef idx="1">
+            <a:schemeClr val="accent1"/>
+          </a:fillRef>
+          <a:effectRef idx="0">
+            <a:schemeClr val="accent1"/>
+          </a:effectRef>
+          <a:fontRef idx="minor">
+            <a:schemeClr val="lt1"/>
+          </a:fontRef>
+        </p:style>
+        <p:txBody>
+          <a:bodyPr rtlCol="0" anchor="ctr"/>
+          <a:lstStyle/>
+          <a:p>
+            <a:pPr algn="ctr"/>
+            <a:r>
+              <a:rPr lang="en-SE" sz="1200" dirty="0">
+                <a:solidFill>
+                  <a:schemeClr val="tx1"/>
+                </a:solidFill>
+              </a:rPr>
+              <a:t>Node 86</a:t>
+            </a:r>
+          </a:p>
+          <a:p>
+            <a:pPr algn="ctr"/>
+            <a:r>
+              <a:rPr lang="en-SE" sz="1200" dirty="0" err="1">
+                <a:solidFill>
+                  <a:schemeClr val="tx1"/>
+                </a:solidFill>
+              </a:rPr>
+              <a:t>NodeId</a:t>
+            </a:r>
+            <a:r>
+              <a:rPr lang="en-SE" sz="1200" dirty="0">
+                <a:solidFill>
+                  <a:schemeClr val="tx1"/>
+                </a:solidFill>
+              </a:rPr>
+              <a:t>=2</a:t>
+            </a:r>
+          </a:p>
+          <a:p>
+            <a:pPr algn="ctr"/>
+            <a:r>
+              <a:rPr lang="en-SE" sz="1200" dirty="0">
+                <a:solidFill>
+                  <a:schemeClr val="tx1"/>
+                </a:solidFill>
+              </a:rPr>
+              <a:t>Office</a:t>
+            </a:r>
+          </a:p>
+        </p:txBody>
+      </p:sp>
+      <p:cxnSp>
+        <p:nvCxnSpPr>
+          <p:cNvPr id="9" name="Straight Arrow Connector 8">
+            <a:extLst>
+              <a:ext uri="{FF2B5EF4-FFF2-40B4-BE49-F238E27FC236}">
+                <a16:creationId xmlns:a16="http://schemas.microsoft.com/office/drawing/2014/main" id="{2A111E6A-2723-4EE6-A747-D9195E974A0A}"/>
+              </a:ext>
+            </a:extLst>
+          </p:cNvPr>
+          <p:cNvCxnSpPr>
+            <a:stCxn id="3" idx="3"/>
+            <a:endCxn id="4" idx="1"/>
+          </p:cNvCxnSpPr>
+          <p:nvPr/>
+        </p:nvCxnSpPr>
+        <p:spPr>
+          <a:xfrm>
+            <a:off x="3150218" y="3007794"/>
+            <a:ext cx="1914492" cy="711858"/>
+          </a:xfrm>
+          <a:prstGeom prst="straightConnector1">
+            <a:avLst/>
+          </a:prstGeom>
+          <a:ln>
+            <a:tailEnd type="triangle"/>
+          </a:ln>
+        </p:spPr>
+        <p:style>
+          <a:lnRef idx="1">
+            <a:schemeClr val="accent1"/>
+          </a:lnRef>
+          <a:fillRef idx="0">
+            <a:schemeClr val="accent1"/>
+          </a:fillRef>
+          <a:effectRef idx="0">
+            <a:schemeClr val="accent1"/>
+          </a:effectRef>
+          <a:fontRef idx="minor">
+            <a:schemeClr val="tx1"/>
+          </a:fontRef>
+        </p:style>
+      </p:cxnSp>
+      <p:cxnSp>
+        <p:nvCxnSpPr>
+          <p:cNvPr id="11" name="Straight Arrow Connector 10">
+            <a:extLst>
+              <a:ext uri="{FF2B5EF4-FFF2-40B4-BE49-F238E27FC236}">
+                <a16:creationId xmlns:a16="http://schemas.microsoft.com/office/drawing/2014/main" id="{B9D30099-33AA-4118-95B0-39E7C82F1CF7}"/>
+              </a:ext>
+            </a:extLst>
+          </p:cNvPr>
+          <p:cNvCxnSpPr>
+            <a:stCxn id="4" idx="3"/>
+            <a:endCxn id="5" idx="1"/>
+          </p:cNvCxnSpPr>
+          <p:nvPr/>
+        </p:nvCxnSpPr>
+        <p:spPr>
+          <a:xfrm>
+            <a:off x="5979110" y="3719652"/>
+            <a:ext cx="1914492" cy="0"/>
+          </a:xfrm>
+          <a:prstGeom prst="straightConnector1">
+            <a:avLst/>
+          </a:prstGeom>
+          <a:ln>
+            <a:tailEnd type="triangle"/>
+          </a:ln>
+        </p:spPr>
+        <p:style>
+          <a:lnRef idx="1">
+            <a:schemeClr val="accent1"/>
+          </a:lnRef>
+          <a:fillRef idx="0">
+            <a:schemeClr val="accent1"/>
+          </a:fillRef>
+          <a:effectRef idx="0">
+            <a:schemeClr val="accent1"/>
+          </a:effectRef>
+          <a:fontRef idx="minor">
+            <a:schemeClr val="tx1"/>
+          </a:fontRef>
+        </p:style>
+      </p:cxnSp>
+      <p:sp>
+        <p:nvSpPr>
+          <p:cNvPr id="16" name="TextBox 15">
+            <a:extLst>
+              <a:ext uri="{FF2B5EF4-FFF2-40B4-BE49-F238E27FC236}">
+                <a16:creationId xmlns:a16="http://schemas.microsoft.com/office/drawing/2014/main" id="{1E3DB0FC-636E-47D3-9FB9-9F724BD0E3A7}"/>
+              </a:ext>
+            </a:extLst>
+          </p:cNvPr>
+          <p:cNvSpPr txBox="1"/>
+          <p:nvPr/>
+        </p:nvSpPr>
+        <p:spPr>
+          <a:xfrm>
+            <a:off x="5064710" y="3019564"/>
+            <a:ext cx="780983" cy="246221"/>
+          </a:xfrm>
+          <a:prstGeom prst="rect">
+            <a:avLst/>
+          </a:prstGeom>
+          <a:noFill/>
+        </p:spPr>
+        <p:txBody>
+          <a:bodyPr wrap="none" rtlCol="0">
+            <a:spAutoFit/>
+          </a:bodyPr>
+          <a:lstStyle/>
+          <a:p>
+            <a:r>
+              <a:rPr lang="en-SE" sz="1000" dirty="0"/>
+              <a:t>Temp/Hum</a:t>
+            </a:r>
+          </a:p>
+        </p:txBody>
+      </p:sp>
+      <p:sp>
+        <p:nvSpPr>
+          <p:cNvPr id="17" name="TextBox 16">
+            <a:extLst>
+              <a:ext uri="{FF2B5EF4-FFF2-40B4-BE49-F238E27FC236}">
+                <a16:creationId xmlns:a16="http://schemas.microsoft.com/office/drawing/2014/main" id="{74DEF83C-FB96-4AF1-944F-2BA9A95208FC}"/>
+              </a:ext>
+            </a:extLst>
+          </p:cNvPr>
+          <p:cNvSpPr txBox="1"/>
+          <p:nvPr/>
+        </p:nvSpPr>
+        <p:spPr>
+          <a:xfrm>
+            <a:off x="8808002" y="3248165"/>
+            <a:ext cx="1119217" cy="1015663"/>
+          </a:xfrm>
+          <a:prstGeom prst="rect">
+            <a:avLst/>
+          </a:prstGeom>
+          <a:noFill/>
+        </p:spPr>
+        <p:txBody>
+          <a:bodyPr wrap="none" rtlCol="0">
+            <a:spAutoFit/>
+          </a:bodyPr>
+          <a:lstStyle/>
+          <a:p>
+            <a:r>
+              <a:rPr lang="en-SE" sz="1000" dirty="0"/>
+              <a:t>time</a:t>
+            </a:r>
+          </a:p>
+          <a:p>
+            <a:r>
+              <a:rPr lang="sv-SE" sz="1000" dirty="0"/>
+              <a:t>I</a:t>
+            </a:r>
+            <a:r>
+              <a:rPr lang="en-SE" sz="1000" dirty="0" err="1"/>
+              <a:t>ndoor</a:t>
+            </a:r>
+            <a:r>
+              <a:rPr lang="en-SE" sz="1000" dirty="0"/>
+              <a:t> temp</a:t>
+            </a:r>
+          </a:p>
+          <a:p>
+            <a:r>
+              <a:rPr lang="sv-SE" sz="1000" dirty="0"/>
+              <a:t>O</a:t>
+            </a:r>
+            <a:r>
+              <a:rPr lang="en-SE" sz="1000" dirty="0" err="1"/>
+              <a:t>utdoor</a:t>
+            </a:r>
+            <a:r>
+              <a:rPr lang="en-SE" sz="1000" dirty="0"/>
+              <a:t> temp</a:t>
+            </a:r>
+          </a:p>
+          <a:p>
+            <a:r>
+              <a:rPr lang="sv-SE" sz="1000" dirty="0"/>
+              <a:t>O</a:t>
+            </a:r>
+            <a:r>
+              <a:rPr lang="en-SE" sz="1000" dirty="0" err="1"/>
+              <a:t>utdoor</a:t>
+            </a:r>
+            <a:r>
+              <a:rPr lang="en-SE" sz="1000" dirty="0"/>
+              <a:t> humidity</a:t>
+            </a:r>
+          </a:p>
+          <a:p>
+            <a:r>
+              <a:rPr lang="en-SE" sz="1000" dirty="0"/>
+              <a:t>UV-Index</a:t>
+            </a:r>
+          </a:p>
+          <a:p>
+            <a:r>
+              <a:rPr lang="en-SE" sz="1000" dirty="0"/>
+              <a:t>Air pressure</a:t>
+            </a:r>
+          </a:p>
+        </p:txBody>
+      </p:sp>
+      <p:sp>
+        <p:nvSpPr>
+          <p:cNvPr id="26" name="TextBox 18">
+            <a:extLst>
+              <a:ext uri="{FF2B5EF4-FFF2-40B4-BE49-F238E27FC236}">
+                <a16:creationId xmlns:a16="http://schemas.microsoft.com/office/drawing/2014/main" id="{B3968AD3-E319-4DDA-8B7B-EAD6035E8052}"/>
+              </a:ext>
+            </a:extLst>
+          </p:cNvPr>
+          <p:cNvSpPr txBox="1"/>
+          <p:nvPr/>
+        </p:nvSpPr>
+        <p:spPr>
+          <a:xfrm>
+            <a:off x="3150218" y="2478953"/>
+            <a:ext cx="780983" cy="246221"/>
+          </a:xfrm>
+          <a:prstGeom prst="rect">
+            <a:avLst/>
+          </a:prstGeom>
+          <a:noFill/>
+        </p:spPr>
+        <p:txBody>
+          <a:bodyPr wrap="none" rtlCol="0">
+            <a:spAutoFit/>
+          </a:bodyPr>
+          <a:lstStyle/>
+          <a:p>
+            <a:r>
+              <a:rPr lang="en-SE" sz="1000" dirty="0"/>
+              <a:t>Temp/Hum</a:t>
+            </a:r>
+          </a:p>
+        </p:txBody>
+      </p:sp>
+      <p:sp>
+        <p:nvSpPr>
+          <p:cNvPr id="27" name="Rectangle 2">
+            <a:extLst>
+              <a:ext uri="{FF2B5EF4-FFF2-40B4-BE49-F238E27FC236}">
+                <a16:creationId xmlns:a16="http://schemas.microsoft.com/office/drawing/2014/main" id="{446D5DD0-C63A-46EA-9553-C93EA9E6B045}"/>
+              </a:ext>
+            </a:extLst>
+          </p:cNvPr>
+          <p:cNvSpPr/>
+          <p:nvPr/>
+        </p:nvSpPr>
+        <p:spPr>
+          <a:xfrm>
+            <a:off x="2235818" y="3734564"/>
+            <a:ext cx="914400" cy="914400"/>
+          </a:xfrm>
+          <a:prstGeom prst="rect">
+            <a:avLst/>
+          </a:prstGeom>
+          <a:solidFill>
+            <a:srgbClr val="92D050">
+              <a:alpha val="42000"/>
+            </a:srgbClr>
+          </a:solidFill>
+          <a:ln>
+            <a:solidFill>
+              <a:schemeClr val="accent1">
+                <a:shade val="50000"/>
+                <a:alpha val="86000"/>
+              </a:schemeClr>
+            </a:solidFill>
+          </a:ln>
+        </p:spPr>
+        <p:style>
+          <a:lnRef idx="2">
+            <a:schemeClr val="accent1">
+              <a:shade val="50000"/>
+            </a:schemeClr>
+          </a:lnRef>
+          <a:fillRef idx="1">
+            <a:schemeClr val="accent1"/>
+          </a:fillRef>
+          <a:effectRef idx="0">
+            <a:schemeClr val="accent1"/>
+          </a:effectRef>
+          <a:fontRef idx="minor">
+            <a:schemeClr val="lt1"/>
+          </a:fontRef>
+        </p:style>
+        <p:txBody>
+          <a:bodyPr rtlCol="0" anchor="ctr"/>
+          <a:lstStyle/>
+          <a:p>
+            <a:pPr algn="ctr"/>
+            <a:r>
+              <a:rPr lang="en-SE" sz="1200" dirty="0">
+                <a:solidFill>
+                  <a:schemeClr val="tx1"/>
+                </a:solidFill>
+              </a:rPr>
+              <a:t>Node 5</a:t>
+            </a:r>
+          </a:p>
+          <a:p>
+            <a:pPr algn="ctr"/>
+            <a:r>
+              <a:rPr lang="en-SE" sz="1200" dirty="0" err="1">
+                <a:solidFill>
+                  <a:schemeClr val="tx1"/>
+                </a:solidFill>
+              </a:rPr>
+              <a:t>Frontyard</a:t>
+            </a:r>
+            <a:endParaRPr lang="en-SE" sz="1200" dirty="0">
+              <a:solidFill>
+                <a:schemeClr val="tx1"/>
+              </a:solidFill>
+            </a:endParaRPr>
+          </a:p>
+        </p:txBody>
+      </p:sp>
+      <p:cxnSp>
+        <p:nvCxnSpPr>
+          <p:cNvPr id="30" name="Rak pilkoppling 29">
+            <a:extLst>
+              <a:ext uri="{FF2B5EF4-FFF2-40B4-BE49-F238E27FC236}">
+                <a16:creationId xmlns:a16="http://schemas.microsoft.com/office/drawing/2014/main" id="{437E73ED-91EA-4D2D-9CD7-04BCB59FE6F1}"/>
+              </a:ext>
+            </a:extLst>
+          </p:cNvPr>
+          <p:cNvCxnSpPr>
+            <a:stCxn id="27" idx="3"/>
+            <a:endCxn id="4" idx="1"/>
+          </p:cNvCxnSpPr>
+          <p:nvPr/>
+        </p:nvCxnSpPr>
+        <p:spPr>
+          <a:xfrm flipV="1">
+            <a:off x="3150218" y="3719652"/>
+            <a:ext cx="1914492" cy="472112"/>
+          </a:xfrm>
+          <a:prstGeom prst="straightConnector1">
+            <a:avLst/>
+          </a:prstGeom>
+          <a:ln>
+            <a:tailEnd type="triangle"/>
+          </a:ln>
+        </p:spPr>
+        <p:style>
+          <a:lnRef idx="1">
+            <a:schemeClr val="accent1"/>
+          </a:lnRef>
+          <a:fillRef idx="0">
+            <a:schemeClr val="accent1"/>
+          </a:fillRef>
+          <a:effectRef idx="0">
+            <a:schemeClr val="accent1"/>
+          </a:effectRef>
+          <a:fontRef idx="minor">
+            <a:schemeClr val="tx1"/>
+          </a:fontRef>
+        </p:style>
+      </p:cxnSp>
+      <p:sp>
+        <p:nvSpPr>
+          <p:cNvPr id="31" name="TextBox 18">
+            <a:extLst>
+              <a:ext uri="{FF2B5EF4-FFF2-40B4-BE49-F238E27FC236}">
+                <a16:creationId xmlns:a16="http://schemas.microsoft.com/office/drawing/2014/main" id="{ADA8EBCD-8E37-4A41-9452-695877CD2AA5}"/>
+              </a:ext>
+            </a:extLst>
+          </p:cNvPr>
+          <p:cNvSpPr txBox="1"/>
+          <p:nvPr/>
+        </p:nvSpPr>
+        <p:spPr>
+          <a:xfrm>
+            <a:off x="3150218" y="3785033"/>
+            <a:ext cx="1048685" cy="246221"/>
+          </a:xfrm>
+          <a:prstGeom prst="rect">
+            <a:avLst/>
+          </a:prstGeom>
+          <a:noFill/>
+        </p:spPr>
+        <p:txBody>
+          <a:bodyPr wrap="none" rtlCol="0">
+            <a:spAutoFit/>
+          </a:bodyPr>
+          <a:lstStyle/>
+          <a:p>
+            <a:r>
+              <a:rPr lang="en-SE" sz="1000" dirty="0"/>
+              <a:t>UVI/Air pressure</a:t>
+            </a:r>
+          </a:p>
+        </p:txBody>
+      </p:sp>
+    </p:spTree>
+    <p:extLst>
+      <p:ext uri="{BB962C8B-B14F-4D97-AF65-F5344CB8AC3E}">
+        <p14:creationId xmlns:p14="http://schemas.microsoft.com/office/powerpoint/2010/main" val="3186348832"/>
+      </p:ext>
+    </p:extLst>
+  </p:cSld>
+  <p:clrMapOvr>
+    <a:masterClrMapping/>
+  </p:clrMapOvr>
+</p:sld>
+</file>
+
+<file path=ppt/slides/slide5.xml><?xml version="1.0" encoding="utf-8"?>
+<p:sld xmlns:a="http://schemas.openxmlformats.org/drawingml/2006/main" xmlns:r="http://schemas.openxmlformats.org/officeDocument/2006/relationships" xmlns:p="http://schemas.openxmlformats.org/presentationml/2006/main">
+  <p:cSld>
+    <p:spTree>
+      <p:nvGrpSpPr>
+        <p:cNvPr id="1" name=""/>
+        <p:cNvGrpSpPr/>
+        <p:nvPr/>
+      </p:nvGrpSpPr>
+      <p:grpSpPr>
+        <a:xfrm>
+          <a:off x="0" y="0"/>
+          <a:ext cx="0" cy="0"/>
+          <a:chOff x="0" y="0"/>
+          <a:chExt cx="0" cy="0"/>
+        </a:xfrm>
+      </p:grpSpPr>
+      <p:sp>
+        <p:nvSpPr>
+          <p:cNvPr id="2" name="Title 1">
+            <a:extLst>
+              <a:ext uri="{FF2B5EF4-FFF2-40B4-BE49-F238E27FC236}">
+                <a16:creationId xmlns:a16="http://schemas.microsoft.com/office/drawing/2014/main" id="{AF0E3A21-EA92-4943-A69B-C8BEEC506EC5}"/>
+              </a:ext>
+            </a:extLst>
+          </p:cNvPr>
+          <p:cNvSpPr>
+            <a:spLocks noGrp="1"/>
+          </p:cNvSpPr>
+          <p:nvPr>
+            <p:ph type="title"/>
+          </p:nvPr>
+        </p:nvSpPr>
+        <p:spPr/>
+        <p:txBody>
+          <a:bodyPr/>
+          <a:lstStyle/>
+          <a:p>
+            <a:r>
+              <a:rPr lang="en-SE" dirty="0"/>
+              <a:t>Topology: Star Distribution</a:t>
+            </a:r>
+            <a:br>
+              <a:rPr lang="en-SE" dirty="0"/>
+            </a:br>
+            <a:r>
+              <a:rPr lang="en-SE" dirty="0"/>
+              <a:t>Garden side</a:t>
+            </a:r>
+          </a:p>
+        </p:txBody>
+      </p:sp>
+      <p:sp>
+        <p:nvSpPr>
+          <p:cNvPr id="3" name="Rectangle 2">
+            <a:extLst>
+              <a:ext uri="{FF2B5EF4-FFF2-40B4-BE49-F238E27FC236}">
+                <a16:creationId xmlns:a16="http://schemas.microsoft.com/office/drawing/2014/main" id="{772D33C7-F15A-4328-859F-268788CDC37F}"/>
+              </a:ext>
+            </a:extLst>
+          </p:cNvPr>
+          <p:cNvSpPr/>
+          <p:nvPr/>
+        </p:nvSpPr>
+        <p:spPr>
+          <a:xfrm>
+            <a:off x="2235818" y="2550594"/>
+            <a:ext cx="914400" cy="914400"/>
+          </a:xfrm>
+          <a:prstGeom prst="rect">
+            <a:avLst/>
+          </a:prstGeom>
+          <a:solidFill>
+            <a:srgbClr val="92D050">
+              <a:alpha val="42000"/>
+            </a:srgbClr>
+          </a:solidFill>
+          <a:ln>
+            <a:solidFill>
+              <a:schemeClr val="accent1">
+                <a:shade val="50000"/>
+                <a:alpha val="86000"/>
+              </a:schemeClr>
+            </a:solidFill>
+          </a:ln>
+        </p:spPr>
+        <p:style>
+          <a:lnRef idx="2">
+            <a:schemeClr val="accent1">
+              <a:shade val="50000"/>
+            </a:schemeClr>
+          </a:lnRef>
+          <a:fillRef idx="1">
+            <a:schemeClr val="accent1"/>
+          </a:fillRef>
+          <a:effectRef idx="0">
+            <a:schemeClr val="accent1"/>
+          </a:effectRef>
+          <a:fontRef idx="minor">
+            <a:schemeClr val="lt1"/>
+          </a:fontRef>
+        </p:style>
+        <p:txBody>
+          <a:bodyPr rtlCol="0" anchor="ctr"/>
+          <a:lstStyle/>
+          <a:p>
+            <a:pPr algn="ctr"/>
+            <a:r>
+              <a:rPr lang="en-SE" sz="1200" dirty="0">
+                <a:solidFill>
+                  <a:schemeClr val="tx1"/>
+                </a:solidFill>
+              </a:rPr>
+              <a:t>Node 27</a:t>
+            </a:r>
+          </a:p>
+          <a:p>
+            <a:pPr algn="ctr"/>
+            <a:r>
+              <a:rPr lang="en-SE" sz="1200" dirty="0">
+                <a:solidFill>
+                  <a:schemeClr val="tx1"/>
+                </a:solidFill>
+              </a:rPr>
+              <a:t>Pergola</a:t>
+            </a:r>
+          </a:p>
+        </p:txBody>
+      </p:sp>
+      <p:sp>
+        <p:nvSpPr>
+          <p:cNvPr id="4" name="Rectangle 3">
+            <a:extLst>
+              <a:ext uri="{FF2B5EF4-FFF2-40B4-BE49-F238E27FC236}">
+                <a16:creationId xmlns:a16="http://schemas.microsoft.com/office/drawing/2014/main" id="{22685319-BF4F-4CC2-8AD1-AF959C07D429}"/>
+              </a:ext>
+            </a:extLst>
+          </p:cNvPr>
+          <p:cNvSpPr/>
+          <p:nvPr/>
+        </p:nvSpPr>
+        <p:spPr>
+          <a:xfrm>
+            <a:off x="5064710" y="3262452"/>
+            <a:ext cx="914400" cy="914400"/>
+          </a:xfrm>
+          <a:prstGeom prst="rect">
+            <a:avLst/>
+          </a:prstGeom>
+          <a:solidFill>
+            <a:srgbClr val="92D050">
+              <a:alpha val="42000"/>
+            </a:srgbClr>
+          </a:solidFill>
+          <a:ln>
+            <a:solidFill>
+              <a:schemeClr val="accent1">
+                <a:shade val="50000"/>
+                <a:alpha val="86000"/>
+              </a:schemeClr>
+            </a:solidFill>
+          </a:ln>
+        </p:spPr>
+        <p:style>
+          <a:lnRef idx="2">
+            <a:schemeClr val="accent1">
+              <a:shade val="50000"/>
+            </a:schemeClr>
+          </a:lnRef>
+          <a:fillRef idx="1">
+            <a:schemeClr val="accent1"/>
+          </a:fillRef>
+          <a:effectRef idx="0">
+            <a:schemeClr val="accent1"/>
+          </a:effectRef>
+          <a:fontRef idx="minor">
+            <a:schemeClr val="lt1"/>
+          </a:fontRef>
+        </p:style>
+        <p:txBody>
+          <a:bodyPr rtlCol="0" anchor="ctr"/>
+          <a:lstStyle/>
+          <a:p>
+            <a:pPr algn="ctr"/>
+            <a:r>
+              <a:rPr lang="en-SE" sz="1200" dirty="0">
+                <a:solidFill>
+                  <a:schemeClr val="tx1"/>
+                </a:solidFill>
+              </a:rPr>
+              <a:t>Node 95</a:t>
+            </a:r>
+          </a:p>
+          <a:p>
+            <a:pPr algn="ctr"/>
+            <a:r>
+              <a:rPr lang="en-SE" sz="1200" dirty="0">
+                <a:solidFill>
+                  <a:schemeClr val="tx1"/>
+                </a:solidFill>
+              </a:rPr>
+              <a:t>Node Id = 1</a:t>
+            </a:r>
+          </a:p>
+          <a:p>
+            <a:pPr algn="ctr"/>
+            <a:r>
+              <a:rPr lang="en-SE" sz="1200" dirty="0">
+                <a:solidFill>
+                  <a:schemeClr val="tx1"/>
+                </a:solidFill>
+              </a:rPr>
+              <a:t>Patio</a:t>
+            </a:r>
+          </a:p>
+        </p:txBody>
+      </p:sp>
+      <p:sp>
+        <p:nvSpPr>
+          <p:cNvPr id="5" name="Rectangle 4">
+            <a:extLst>
+              <a:ext uri="{FF2B5EF4-FFF2-40B4-BE49-F238E27FC236}">
+                <a16:creationId xmlns:a16="http://schemas.microsoft.com/office/drawing/2014/main" id="{403C9F06-3E31-43A4-8FAC-04BA9BE8828D}"/>
+              </a:ext>
+            </a:extLst>
+          </p:cNvPr>
+          <p:cNvSpPr/>
+          <p:nvPr/>
+        </p:nvSpPr>
+        <p:spPr>
+          <a:xfrm>
+            <a:off x="7974349" y="2739461"/>
+            <a:ext cx="914400" cy="914400"/>
+          </a:xfrm>
+          <a:prstGeom prst="rect">
+            <a:avLst/>
+          </a:prstGeom>
+          <a:solidFill>
+            <a:srgbClr val="92D050">
+              <a:alpha val="42000"/>
+            </a:srgbClr>
+          </a:solidFill>
+          <a:ln>
+            <a:solidFill>
+              <a:schemeClr val="accent1">
+                <a:shade val="50000"/>
+                <a:alpha val="86000"/>
+              </a:schemeClr>
+            </a:solidFill>
+          </a:ln>
+        </p:spPr>
+        <p:style>
+          <a:lnRef idx="2">
+            <a:schemeClr val="accent1">
+              <a:shade val="50000"/>
+            </a:schemeClr>
+          </a:lnRef>
+          <a:fillRef idx="1">
+            <a:schemeClr val="accent1"/>
+          </a:fillRef>
+          <a:effectRef idx="0">
+            <a:schemeClr val="accent1"/>
+          </a:effectRef>
+          <a:fontRef idx="minor">
+            <a:schemeClr val="lt1"/>
+          </a:fontRef>
+        </p:style>
+        <p:txBody>
+          <a:bodyPr rtlCol="0" anchor="ctr"/>
+          <a:lstStyle/>
+          <a:p>
+            <a:pPr algn="ctr"/>
+            <a:r>
+              <a:rPr lang="en-SE" sz="1200" dirty="0">
+                <a:solidFill>
+                  <a:schemeClr val="tx1"/>
+                </a:solidFill>
+              </a:rPr>
+              <a:t>Node 96</a:t>
+            </a:r>
+          </a:p>
+          <a:p>
+            <a:pPr algn="ctr"/>
+            <a:r>
+              <a:rPr lang="en-SE" sz="1200" dirty="0" err="1">
+                <a:solidFill>
+                  <a:schemeClr val="tx1"/>
+                </a:solidFill>
+              </a:rPr>
+              <a:t>NodeId</a:t>
+            </a:r>
+            <a:r>
+              <a:rPr lang="en-SE" sz="1200" dirty="0">
+                <a:solidFill>
+                  <a:schemeClr val="tx1"/>
+                </a:solidFill>
+              </a:rPr>
+              <a:t>=2</a:t>
+            </a:r>
+          </a:p>
+          <a:p>
+            <a:pPr algn="ctr"/>
+            <a:r>
+              <a:rPr lang="en-SE" sz="1200" dirty="0">
+                <a:solidFill>
+                  <a:schemeClr val="tx1"/>
+                </a:solidFill>
+              </a:rPr>
+              <a:t>Livingroom</a:t>
+            </a:r>
+          </a:p>
+        </p:txBody>
+      </p:sp>
+      <p:sp>
+        <p:nvSpPr>
+          <p:cNvPr id="6" name="Rectangle 5">
+            <a:extLst>
+              <a:ext uri="{FF2B5EF4-FFF2-40B4-BE49-F238E27FC236}">
+                <a16:creationId xmlns:a16="http://schemas.microsoft.com/office/drawing/2014/main" id="{1409038A-EABC-494E-812B-561023384C6C}"/>
+              </a:ext>
+            </a:extLst>
+          </p:cNvPr>
+          <p:cNvSpPr/>
+          <p:nvPr/>
+        </p:nvSpPr>
+        <p:spPr>
+          <a:xfrm>
+            <a:off x="7974349" y="3844362"/>
+            <a:ext cx="914400" cy="914400"/>
+          </a:xfrm>
+          <a:prstGeom prst="rect">
+            <a:avLst/>
+          </a:prstGeom>
+          <a:solidFill>
+            <a:srgbClr val="92D050">
+              <a:alpha val="42000"/>
+            </a:srgbClr>
+          </a:solidFill>
+          <a:ln>
+            <a:solidFill>
+              <a:schemeClr val="accent1">
+                <a:shade val="50000"/>
+                <a:alpha val="86000"/>
+              </a:schemeClr>
+            </a:solidFill>
+          </a:ln>
+        </p:spPr>
+        <p:style>
+          <a:lnRef idx="2">
+            <a:schemeClr val="accent1">
+              <a:shade val="50000"/>
+            </a:schemeClr>
+          </a:lnRef>
+          <a:fillRef idx="1">
+            <a:schemeClr val="accent1"/>
+          </a:fillRef>
+          <a:effectRef idx="0">
+            <a:schemeClr val="accent1"/>
+          </a:effectRef>
+          <a:fontRef idx="minor">
+            <a:schemeClr val="lt1"/>
+          </a:fontRef>
+        </p:style>
+        <p:txBody>
+          <a:bodyPr rtlCol="0" anchor="ctr"/>
+          <a:lstStyle/>
+          <a:p>
+            <a:pPr algn="ctr"/>
+            <a:r>
+              <a:rPr lang="en-SE" sz="1200" dirty="0">
+                <a:solidFill>
+                  <a:schemeClr val="tx1"/>
+                </a:solidFill>
+              </a:rPr>
+              <a:t>Node 97</a:t>
+            </a:r>
+          </a:p>
+          <a:p>
+            <a:pPr algn="ctr"/>
+            <a:r>
+              <a:rPr lang="en-SE" sz="1200" dirty="0" err="1">
+                <a:solidFill>
+                  <a:schemeClr val="tx1"/>
+                </a:solidFill>
+              </a:rPr>
+              <a:t>NodeId</a:t>
+            </a:r>
+            <a:r>
+              <a:rPr lang="en-SE" sz="1200" dirty="0">
+                <a:solidFill>
+                  <a:schemeClr val="tx1"/>
+                </a:solidFill>
+              </a:rPr>
+              <a:t>=3</a:t>
+            </a:r>
+          </a:p>
+          <a:p>
+            <a:pPr algn="ctr"/>
+            <a:r>
+              <a:rPr lang="en-SE" sz="1200" dirty="0">
+                <a:solidFill>
+                  <a:schemeClr val="tx1"/>
+                </a:solidFill>
+              </a:rPr>
+              <a:t>Bedroom</a:t>
+            </a:r>
+          </a:p>
+        </p:txBody>
+      </p:sp>
+      <p:cxnSp>
+        <p:nvCxnSpPr>
+          <p:cNvPr id="9" name="Straight Arrow Connector 8">
+            <a:extLst>
+              <a:ext uri="{FF2B5EF4-FFF2-40B4-BE49-F238E27FC236}">
+                <a16:creationId xmlns:a16="http://schemas.microsoft.com/office/drawing/2014/main" id="{2A111E6A-2723-4EE6-A747-D9195E974A0A}"/>
+              </a:ext>
+            </a:extLst>
+          </p:cNvPr>
+          <p:cNvCxnSpPr>
+            <a:stCxn id="3" idx="3"/>
+            <a:endCxn id="4" idx="1"/>
+          </p:cNvCxnSpPr>
+          <p:nvPr/>
+        </p:nvCxnSpPr>
+        <p:spPr>
+          <a:xfrm>
+            <a:off x="3150218" y="3007794"/>
+            <a:ext cx="1914492" cy="711858"/>
+          </a:xfrm>
+          <a:prstGeom prst="straightConnector1">
+            <a:avLst/>
+          </a:prstGeom>
+          <a:ln>
+            <a:tailEnd type="triangle"/>
+          </a:ln>
+        </p:spPr>
+        <p:style>
+          <a:lnRef idx="1">
+            <a:schemeClr val="accent1"/>
+          </a:lnRef>
+          <a:fillRef idx="0">
+            <a:schemeClr val="accent1"/>
+          </a:fillRef>
+          <a:effectRef idx="0">
+            <a:schemeClr val="accent1"/>
+          </a:effectRef>
+          <a:fontRef idx="minor">
+            <a:schemeClr val="tx1"/>
+          </a:fontRef>
+        </p:style>
+      </p:cxnSp>
+      <p:cxnSp>
+        <p:nvCxnSpPr>
+          <p:cNvPr id="11" name="Straight Arrow Connector 10">
+            <a:extLst>
+              <a:ext uri="{FF2B5EF4-FFF2-40B4-BE49-F238E27FC236}">
+                <a16:creationId xmlns:a16="http://schemas.microsoft.com/office/drawing/2014/main" id="{B9D30099-33AA-4118-95B0-39E7C82F1CF7}"/>
+              </a:ext>
+            </a:extLst>
+          </p:cNvPr>
+          <p:cNvCxnSpPr>
+            <a:stCxn id="4" idx="3"/>
+            <a:endCxn id="5" idx="1"/>
+          </p:cNvCxnSpPr>
+          <p:nvPr/>
+        </p:nvCxnSpPr>
+        <p:spPr>
+          <a:xfrm flipV="1">
+            <a:off x="5979110" y="3196661"/>
+            <a:ext cx="1995239" cy="522991"/>
+          </a:xfrm>
+          <a:prstGeom prst="straightConnector1">
+            <a:avLst/>
+          </a:prstGeom>
+          <a:ln>
+            <a:tailEnd type="triangle"/>
+          </a:ln>
+        </p:spPr>
+        <p:style>
+          <a:lnRef idx="1">
+            <a:schemeClr val="accent1"/>
+          </a:lnRef>
+          <a:fillRef idx="0">
+            <a:schemeClr val="accent1"/>
+          </a:fillRef>
+          <a:effectRef idx="0">
+            <a:schemeClr val="accent1"/>
+          </a:effectRef>
+          <a:fontRef idx="minor">
+            <a:schemeClr val="tx1"/>
+          </a:fontRef>
+        </p:style>
+      </p:cxnSp>
+      <p:cxnSp>
+        <p:nvCxnSpPr>
+          <p:cNvPr id="13" name="Straight Arrow Connector 12">
+            <a:extLst>
+              <a:ext uri="{FF2B5EF4-FFF2-40B4-BE49-F238E27FC236}">
+                <a16:creationId xmlns:a16="http://schemas.microsoft.com/office/drawing/2014/main" id="{4CB4588D-D231-4976-B9A3-25C72F687E41}"/>
+              </a:ext>
+            </a:extLst>
+          </p:cNvPr>
+          <p:cNvCxnSpPr>
+            <a:stCxn id="4" idx="3"/>
+            <a:endCxn id="6" idx="1"/>
+          </p:cNvCxnSpPr>
+          <p:nvPr/>
+        </p:nvCxnSpPr>
+        <p:spPr>
+          <a:xfrm>
+            <a:off x="5979110" y="3719652"/>
+            <a:ext cx="1995239" cy="581910"/>
+          </a:xfrm>
+          <a:prstGeom prst="straightConnector1">
+            <a:avLst/>
+          </a:prstGeom>
+          <a:ln>
+            <a:tailEnd type="triangle"/>
+          </a:ln>
+        </p:spPr>
+        <p:style>
+          <a:lnRef idx="1">
+            <a:schemeClr val="accent1"/>
+          </a:lnRef>
+          <a:fillRef idx="0">
+            <a:schemeClr val="accent1"/>
+          </a:fillRef>
+          <a:effectRef idx="0">
+            <a:schemeClr val="accent1"/>
+          </a:effectRef>
+          <a:fontRef idx="minor">
+            <a:schemeClr val="tx1"/>
+          </a:fontRef>
+        </p:style>
+      </p:cxnSp>
+      <p:sp>
+        <p:nvSpPr>
+          <p:cNvPr id="16" name="TextBox 15">
+            <a:extLst>
+              <a:ext uri="{FF2B5EF4-FFF2-40B4-BE49-F238E27FC236}">
+                <a16:creationId xmlns:a16="http://schemas.microsoft.com/office/drawing/2014/main" id="{1E3DB0FC-636E-47D3-9FB9-9F724BD0E3A7}"/>
+              </a:ext>
+            </a:extLst>
+          </p:cNvPr>
+          <p:cNvSpPr txBox="1"/>
+          <p:nvPr/>
+        </p:nvSpPr>
+        <p:spPr>
+          <a:xfrm>
+            <a:off x="5064710" y="3019564"/>
+            <a:ext cx="780983" cy="246221"/>
+          </a:xfrm>
+          <a:prstGeom prst="rect">
+            <a:avLst/>
+          </a:prstGeom>
+          <a:noFill/>
+        </p:spPr>
+        <p:txBody>
+          <a:bodyPr wrap="none" rtlCol="0">
+            <a:spAutoFit/>
+          </a:bodyPr>
+          <a:lstStyle/>
+          <a:p>
+            <a:r>
+              <a:rPr lang="en-SE" sz="1000" dirty="0"/>
+              <a:t>Temp/Hum</a:t>
+            </a:r>
+          </a:p>
+        </p:txBody>
+      </p:sp>
+      <p:sp>
+        <p:nvSpPr>
+          <p:cNvPr id="17" name="TextBox 16">
+            <a:extLst>
+              <a:ext uri="{FF2B5EF4-FFF2-40B4-BE49-F238E27FC236}">
+                <a16:creationId xmlns:a16="http://schemas.microsoft.com/office/drawing/2014/main" id="{74DEF83C-FB96-4AF1-944F-2BA9A95208FC}"/>
+              </a:ext>
+            </a:extLst>
+          </p:cNvPr>
+          <p:cNvSpPr txBox="1"/>
+          <p:nvPr/>
+        </p:nvSpPr>
+        <p:spPr>
+          <a:xfrm>
+            <a:off x="8888749" y="2725174"/>
+            <a:ext cx="1119217" cy="1015663"/>
+          </a:xfrm>
+          <a:prstGeom prst="rect">
+            <a:avLst/>
+          </a:prstGeom>
+          <a:noFill/>
+        </p:spPr>
+        <p:txBody>
+          <a:bodyPr wrap="none" rtlCol="0">
+            <a:spAutoFit/>
+          </a:bodyPr>
+          <a:lstStyle/>
+          <a:p>
+            <a:r>
+              <a:rPr lang="en-SE" sz="1000" dirty="0"/>
+              <a:t>time</a:t>
+            </a:r>
+          </a:p>
+          <a:p>
+            <a:r>
+              <a:rPr lang="sv-SE" sz="1000" dirty="0"/>
+              <a:t>I</a:t>
+            </a:r>
+            <a:r>
+              <a:rPr lang="en-SE" sz="1000" dirty="0" err="1"/>
+              <a:t>ndoor</a:t>
+            </a:r>
+            <a:r>
+              <a:rPr lang="en-SE" sz="1000" dirty="0"/>
+              <a:t> temp</a:t>
+            </a:r>
+          </a:p>
+          <a:p>
+            <a:r>
+              <a:rPr lang="sv-SE" sz="1000" dirty="0"/>
+              <a:t>O</a:t>
+            </a:r>
+            <a:r>
+              <a:rPr lang="en-SE" sz="1000" dirty="0" err="1"/>
+              <a:t>utdoor</a:t>
+            </a:r>
+            <a:r>
+              <a:rPr lang="en-SE" sz="1000" dirty="0"/>
+              <a:t> temp</a:t>
+            </a:r>
+          </a:p>
+          <a:p>
+            <a:r>
+              <a:rPr lang="sv-SE" sz="1000" dirty="0"/>
+              <a:t>O</a:t>
+            </a:r>
+            <a:r>
+              <a:rPr lang="en-SE" sz="1000" dirty="0" err="1"/>
+              <a:t>utdoor</a:t>
+            </a:r>
+            <a:r>
+              <a:rPr lang="en-SE" sz="1000" dirty="0"/>
+              <a:t> humidity</a:t>
+            </a:r>
+          </a:p>
+          <a:p>
+            <a:r>
+              <a:rPr lang="en-SE" sz="1000" dirty="0"/>
+              <a:t>UV-Index</a:t>
+            </a:r>
+          </a:p>
+          <a:p>
+            <a:r>
+              <a:rPr lang="en-SE" sz="1000" dirty="0"/>
+              <a:t>Air pressure</a:t>
+            </a:r>
+          </a:p>
+        </p:txBody>
+      </p:sp>
+      <p:sp>
+        <p:nvSpPr>
+          <p:cNvPr id="26" name="TextBox 18">
+            <a:extLst>
+              <a:ext uri="{FF2B5EF4-FFF2-40B4-BE49-F238E27FC236}">
+                <a16:creationId xmlns:a16="http://schemas.microsoft.com/office/drawing/2014/main" id="{B3968AD3-E319-4DDA-8B7B-EAD6035E8052}"/>
+              </a:ext>
+            </a:extLst>
+          </p:cNvPr>
+          <p:cNvSpPr txBox="1"/>
+          <p:nvPr/>
+        </p:nvSpPr>
+        <p:spPr>
+          <a:xfrm>
+            <a:off x="3150218" y="2478953"/>
+            <a:ext cx="780983" cy="246221"/>
+          </a:xfrm>
+          <a:prstGeom prst="rect">
+            <a:avLst/>
+          </a:prstGeom>
+          <a:noFill/>
+        </p:spPr>
+        <p:txBody>
+          <a:bodyPr wrap="none" rtlCol="0">
+            <a:spAutoFit/>
+          </a:bodyPr>
+          <a:lstStyle/>
+          <a:p>
+            <a:r>
+              <a:rPr lang="en-SE" sz="1000" dirty="0"/>
+              <a:t>Temp/Hum</a:t>
+            </a:r>
+          </a:p>
+        </p:txBody>
+      </p:sp>
+      <p:sp>
+        <p:nvSpPr>
+          <p:cNvPr id="27" name="Rectangle 2">
+            <a:extLst>
+              <a:ext uri="{FF2B5EF4-FFF2-40B4-BE49-F238E27FC236}">
+                <a16:creationId xmlns:a16="http://schemas.microsoft.com/office/drawing/2014/main" id="{446D5DD0-C63A-46EA-9553-C93EA9E6B045}"/>
+              </a:ext>
+            </a:extLst>
+          </p:cNvPr>
+          <p:cNvSpPr/>
+          <p:nvPr/>
+        </p:nvSpPr>
+        <p:spPr>
+          <a:xfrm>
+            <a:off x="2235818" y="3734564"/>
+            <a:ext cx="914400" cy="914400"/>
+          </a:xfrm>
+          <a:prstGeom prst="rect">
+            <a:avLst/>
+          </a:prstGeom>
+          <a:solidFill>
+            <a:srgbClr val="92D050">
+              <a:alpha val="42000"/>
+            </a:srgbClr>
+          </a:solidFill>
+          <a:ln>
+            <a:solidFill>
+              <a:schemeClr val="accent1">
+                <a:shade val="50000"/>
+                <a:alpha val="86000"/>
+              </a:schemeClr>
+            </a:solidFill>
+          </a:ln>
+        </p:spPr>
+        <p:style>
+          <a:lnRef idx="2">
+            <a:schemeClr val="accent1">
+              <a:shade val="50000"/>
+            </a:schemeClr>
+          </a:lnRef>
+          <a:fillRef idx="1">
+            <a:schemeClr val="accent1"/>
+          </a:fillRef>
+          <a:effectRef idx="0">
+            <a:schemeClr val="accent1"/>
+          </a:effectRef>
+          <a:fontRef idx="minor">
+            <a:schemeClr val="lt1"/>
+          </a:fontRef>
+        </p:style>
+        <p:txBody>
+          <a:bodyPr rtlCol="0" anchor="ctr"/>
+          <a:lstStyle/>
+          <a:p>
+            <a:pPr algn="ctr"/>
+            <a:r>
+              <a:rPr lang="en-SE" sz="1200" dirty="0">
+                <a:solidFill>
+                  <a:schemeClr val="tx1"/>
+                </a:solidFill>
+              </a:rPr>
+              <a:t>Node 31</a:t>
+            </a:r>
+          </a:p>
+          <a:p>
+            <a:pPr algn="ctr"/>
+            <a:r>
+              <a:rPr lang="en-SE" sz="1200" dirty="0">
+                <a:solidFill>
+                  <a:schemeClr val="tx1"/>
+                </a:solidFill>
+              </a:rPr>
+              <a:t>Pergola</a:t>
+            </a:r>
+          </a:p>
+        </p:txBody>
+      </p:sp>
+      <p:cxnSp>
+        <p:nvCxnSpPr>
+          <p:cNvPr id="30" name="Rak pilkoppling 29">
+            <a:extLst>
+              <a:ext uri="{FF2B5EF4-FFF2-40B4-BE49-F238E27FC236}">
+                <a16:creationId xmlns:a16="http://schemas.microsoft.com/office/drawing/2014/main" id="{437E73ED-91EA-4D2D-9CD7-04BCB59FE6F1}"/>
+              </a:ext>
+            </a:extLst>
+          </p:cNvPr>
+          <p:cNvCxnSpPr>
+            <a:stCxn id="27" idx="3"/>
+            <a:endCxn id="4" idx="1"/>
+          </p:cNvCxnSpPr>
+          <p:nvPr/>
+        </p:nvCxnSpPr>
+        <p:spPr>
+          <a:xfrm flipV="1">
+            <a:off x="3150218" y="3719652"/>
+            <a:ext cx="1914492" cy="472112"/>
+          </a:xfrm>
+          <a:prstGeom prst="straightConnector1">
+            <a:avLst/>
+          </a:prstGeom>
+          <a:ln>
+            <a:tailEnd type="triangle"/>
+          </a:ln>
+        </p:spPr>
+        <p:style>
+          <a:lnRef idx="1">
+            <a:schemeClr val="accent1"/>
+          </a:lnRef>
+          <a:fillRef idx="0">
+            <a:schemeClr val="accent1"/>
+          </a:fillRef>
+          <a:effectRef idx="0">
+            <a:schemeClr val="accent1"/>
+          </a:effectRef>
+          <a:fontRef idx="minor">
+            <a:schemeClr val="tx1"/>
+          </a:fontRef>
+        </p:style>
+      </p:cxnSp>
+      <p:sp>
+        <p:nvSpPr>
+          <p:cNvPr id="31" name="TextBox 18">
+            <a:extLst>
+              <a:ext uri="{FF2B5EF4-FFF2-40B4-BE49-F238E27FC236}">
+                <a16:creationId xmlns:a16="http://schemas.microsoft.com/office/drawing/2014/main" id="{ADA8EBCD-8E37-4A41-9452-695877CD2AA5}"/>
+              </a:ext>
+            </a:extLst>
+          </p:cNvPr>
+          <p:cNvSpPr txBox="1"/>
+          <p:nvPr/>
+        </p:nvSpPr>
+        <p:spPr>
+          <a:xfrm>
+            <a:off x="3150218" y="3785033"/>
+            <a:ext cx="1048685" cy="246221"/>
+          </a:xfrm>
+          <a:prstGeom prst="rect">
+            <a:avLst/>
+          </a:prstGeom>
+          <a:noFill/>
+        </p:spPr>
+        <p:txBody>
+          <a:bodyPr wrap="none" rtlCol="0">
+            <a:spAutoFit/>
+          </a:bodyPr>
+          <a:lstStyle/>
+          <a:p>
+            <a:r>
+              <a:rPr lang="en-SE" sz="1000" dirty="0"/>
+              <a:t>UVI/Air pressure</a:t>
+            </a:r>
+          </a:p>
+        </p:txBody>
+      </p:sp>
+      <p:sp>
+        <p:nvSpPr>
+          <p:cNvPr id="32" name="TextBox 16">
+            <a:extLst>
+              <a:ext uri="{FF2B5EF4-FFF2-40B4-BE49-F238E27FC236}">
+                <a16:creationId xmlns:a16="http://schemas.microsoft.com/office/drawing/2014/main" id="{0DA2CA64-6D55-49A3-9AB8-3A555C97D661}"/>
+              </a:ext>
+            </a:extLst>
+          </p:cNvPr>
+          <p:cNvSpPr txBox="1"/>
+          <p:nvPr/>
+        </p:nvSpPr>
+        <p:spPr>
+          <a:xfrm>
+            <a:off x="8903041" y="3782546"/>
+            <a:ext cx="1119217" cy="1015663"/>
+          </a:xfrm>
+          <a:prstGeom prst="rect">
+            <a:avLst/>
+          </a:prstGeom>
+          <a:noFill/>
+        </p:spPr>
+        <p:txBody>
+          <a:bodyPr wrap="none" rtlCol="0">
+            <a:spAutoFit/>
+          </a:bodyPr>
+          <a:lstStyle/>
+          <a:p>
+            <a:r>
+              <a:rPr lang="en-SE" sz="1000" dirty="0"/>
+              <a:t>time</a:t>
+            </a:r>
+          </a:p>
+          <a:p>
+            <a:r>
+              <a:rPr lang="sv-SE" sz="1000" dirty="0"/>
+              <a:t>I</a:t>
+            </a:r>
+            <a:r>
+              <a:rPr lang="en-SE" sz="1000" dirty="0" err="1"/>
+              <a:t>ndoor</a:t>
+            </a:r>
+            <a:r>
+              <a:rPr lang="en-SE" sz="1000" dirty="0"/>
+              <a:t> temp</a:t>
+            </a:r>
+          </a:p>
+          <a:p>
+            <a:r>
+              <a:rPr lang="sv-SE" sz="1000" dirty="0"/>
+              <a:t>O</a:t>
+            </a:r>
+            <a:r>
+              <a:rPr lang="en-SE" sz="1000" dirty="0" err="1"/>
+              <a:t>utdoor</a:t>
+            </a:r>
+            <a:r>
+              <a:rPr lang="en-SE" sz="1000" dirty="0"/>
+              <a:t> temp</a:t>
+            </a:r>
+          </a:p>
+          <a:p>
+            <a:r>
+              <a:rPr lang="sv-SE" sz="1000" dirty="0"/>
+              <a:t>O</a:t>
+            </a:r>
+            <a:r>
+              <a:rPr lang="en-SE" sz="1000" dirty="0" err="1"/>
+              <a:t>utdoor</a:t>
+            </a:r>
+            <a:r>
+              <a:rPr lang="en-SE" sz="1000" dirty="0"/>
+              <a:t> humidity</a:t>
+            </a:r>
+          </a:p>
+          <a:p>
+            <a:r>
+              <a:rPr lang="en-SE" sz="1000" dirty="0"/>
+              <a:t>UV-Index</a:t>
+            </a:r>
+          </a:p>
+          <a:p>
+            <a:r>
+              <a:rPr lang="en-SE" sz="1000" dirty="0"/>
+              <a:t>Air pressure</a:t>
+            </a:r>
+          </a:p>
+        </p:txBody>
+      </p:sp>
+    </p:spTree>
+    <p:extLst>
+      <p:ext uri="{BB962C8B-B14F-4D97-AF65-F5344CB8AC3E}">
+        <p14:creationId xmlns:p14="http://schemas.microsoft.com/office/powerpoint/2010/main" val="3472360343"/>
+      </p:ext>
+    </p:extLst>
+  </p:cSld>
+  <p:clrMapOvr>
+    <a:masterClrMapping/>
+  </p:clrMapOvr>
+</p:sld>
+</file>
+
+<file path=ppt/slides/slide6.xml><?xml version="1.0" encoding="utf-8"?>
+<p:sld xmlns:a="http://schemas.openxmlformats.org/drawingml/2006/main" xmlns:r="http://schemas.openxmlformats.org/officeDocument/2006/relationships" xmlns:p="http://schemas.openxmlformats.org/presentationml/2006/main">
+  <p:cSld>
+    <p:spTree>
+      <p:nvGrpSpPr>
+        <p:cNvPr id="1" name=""/>
+        <p:cNvGrpSpPr/>
+        <p:nvPr/>
+      </p:nvGrpSpPr>
+      <p:grpSpPr>
+        <a:xfrm>
+          <a:off x="0" y="0"/>
+          <a:ext cx="0" cy="0"/>
+          <a:chOff x="0" y="0"/>
+          <a:chExt cx="0" cy="0"/>
+        </a:xfrm>
+      </p:grpSpPr>
+      <p:sp>
+        <p:nvSpPr>
+          <p:cNvPr id="2" name="Title 1">
+            <a:extLst>
+              <a:ext uri="{FF2B5EF4-FFF2-40B4-BE49-F238E27FC236}">
                 <a16:creationId xmlns:a16="http://schemas.microsoft.com/office/drawing/2014/main" id="{7EE94081-A0BC-4C97-AE60-097A077D2FFC}"/>
               </a:ext>
             </a:extLst>
@@ -6791,7 +8482,7 @@
 </p:sld>
 </file>
 
-<file path=ppt/slides/slide5.xml><?xml version="1.0" encoding="utf-8"?>
+<file path=ppt/slides/slide7.xml><?xml version="1.0" encoding="utf-8"?>
 <p:sld xmlns:a="http://schemas.openxmlformats.org/drawingml/2006/main" xmlns:r="http://schemas.openxmlformats.org/officeDocument/2006/relationships" xmlns:p="http://schemas.openxmlformats.org/presentationml/2006/main">
   <p:cSld>
     <p:bg>

</xml_diff>

<commit_message>
Correction for temperature precision
Corrected that the switch TEMPERATURE_PRECISION had no effect on the program.
If selected any of the precision alternative, default value od 12 bits always was set.
The correction did nt change any functionality for now, but if the precision is needed to change later to a lower precision the switches are working.
</commit_message>
<xml_diff>
--- a/Documentation/ClockNet.pptx
+++ b/Documentation/ClockNet.pptx
@@ -12,6 +12,7 @@
     <p:sldId id="261" r:id="rId6"/>
     <p:sldId id="260" r:id="rId7"/>
     <p:sldId id="259" r:id="rId8"/>
+    <p:sldId id="263" r:id="rId9"/>
   </p:sldIdLst>
   <p:sldSz cx="12192000" cy="6858000"/>
   <p:notesSz cx="6858000" cy="9144000"/>
@@ -267,7 +268,7 @@
           <a:p>
             <a:fld id="{BE8EC4D6-8DFC-4D31-BF3E-167B2F1ECE7E}" type="datetimeFigureOut">
               <a:rPr lang="en-SE" smtClean="0"/>
-              <a:t>2021-02-28</a:t>
+              <a:t>2021-03-10</a:t>
             </a:fld>
             <a:endParaRPr lang="en-SE"/>
           </a:p>
@@ -467,7 +468,7 @@
           <a:p>
             <a:fld id="{BE8EC4D6-8DFC-4D31-BF3E-167B2F1ECE7E}" type="datetimeFigureOut">
               <a:rPr lang="en-SE" smtClean="0"/>
-              <a:t>2021-02-28</a:t>
+              <a:t>2021-03-10</a:t>
             </a:fld>
             <a:endParaRPr lang="en-SE"/>
           </a:p>
@@ -677,7 +678,7 @@
           <a:p>
             <a:fld id="{BE8EC4D6-8DFC-4D31-BF3E-167B2F1ECE7E}" type="datetimeFigureOut">
               <a:rPr lang="en-SE" smtClean="0"/>
-              <a:t>2021-02-28</a:t>
+              <a:t>2021-03-10</a:t>
             </a:fld>
             <a:endParaRPr lang="en-SE"/>
           </a:p>
@@ -877,7 +878,7 @@
           <a:p>
             <a:fld id="{BE8EC4D6-8DFC-4D31-BF3E-167B2F1ECE7E}" type="datetimeFigureOut">
               <a:rPr lang="en-SE" smtClean="0"/>
-              <a:t>2021-02-28</a:t>
+              <a:t>2021-03-10</a:t>
             </a:fld>
             <a:endParaRPr lang="en-SE"/>
           </a:p>
@@ -1153,7 +1154,7 @@
           <a:p>
             <a:fld id="{BE8EC4D6-8DFC-4D31-BF3E-167B2F1ECE7E}" type="datetimeFigureOut">
               <a:rPr lang="en-SE" smtClean="0"/>
-              <a:t>2021-02-28</a:t>
+              <a:t>2021-03-10</a:t>
             </a:fld>
             <a:endParaRPr lang="en-SE"/>
           </a:p>
@@ -1421,7 +1422,7 @@
           <a:p>
             <a:fld id="{BE8EC4D6-8DFC-4D31-BF3E-167B2F1ECE7E}" type="datetimeFigureOut">
               <a:rPr lang="en-SE" smtClean="0"/>
-              <a:t>2021-02-28</a:t>
+              <a:t>2021-03-10</a:t>
             </a:fld>
             <a:endParaRPr lang="en-SE"/>
           </a:p>
@@ -1836,7 +1837,7 @@
           <a:p>
             <a:fld id="{BE8EC4D6-8DFC-4D31-BF3E-167B2F1ECE7E}" type="datetimeFigureOut">
               <a:rPr lang="en-SE" smtClean="0"/>
-              <a:t>2021-02-28</a:t>
+              <a:t>2021-03-10</a:t>
             </a:fld>
             <a:endParaRPr lang="en-SE"/>
           </a:p>
@@ -1978,7 +1979,7 @@
           <a:p>
             <a:fld id="{BE8EC4D6-8DFC-4D31-BF3E-167B2F1ECE7E}" type="datetimeFigureOut">
               <a:rPr lang="en-SE" smtClean="0"/>
-              <a:t>2021-02-28</a:t>
+              <a:t>2021-03-10</a:t>
             </a:fld>
             <a:endParaRPr lang="en-SE"/>
           </a:p>
@@ -2091,7 +2092,7 @@
           <a:p>
             <a:fld id="{BE8EC4D6-8DFC-4D31-BF3E-167B2F1ECE7E}" type="datetimeFigureOut">
               <a:rPr lang="en-SE" smtClean="0"/>
-              <a:t>2021-02-28</a:t>
+              <a:t>2021-03-10</a:t>
             </a:fld>
             <a:endParaRPr lang="en-SE"/>
           </a:p>
@@ -2404,7 +2405,7 @@
           <a:p>
             <a:fld id="{BE8EC4D6-8DFC-4D31-BF3E-167B2F1ECE7E}" type="datetimeFigureOut">
               <a:rPr lang="en-SE" smtClean="0"/>
-              <a:t>2021-02-28</a:t>
+              <a:t>2021-03-10</a:t>
             </a:fld>
             <a:endParaRPr lang="en-SE"/>
           </a:p>
@@ -2693,7 +2694,7 @@
           <a:p>
             <a:fld id="{BE8EC4D6-8DFC-4D31-BF3E-167B2F1ECE7E}" type="datetimeFigureOut">
               <a:rPr lang="en-SE" smtClean="0"/>
-              <a:t>2021-02-28</a:t>
+              <a:t>2021-03-10</a:t>
             </a:fld>
             <a:endParaRPr lang="en-SE"/>
           </a:p>
@@ -2936,7 +2937,7 @@
           <a:p>
             <a:fld id="{BE8EC4D6-8DFC-4D31-BF3E-167B2F1ECE7E}" type="datetimeFigureOut">
               <a:rPr lang="en-SE" smtClean="0"/>
-              <a:t>2021-02-28</a:t>
+              <a:t>2021-03-10</a:t>
             </a:fld>
             <a:endParaRPr lang="en-SE"/>
           </a:p>
@@ -9312,6 +9313,2053 @@
 </p:sld>
 </file>
 
+<file path=ppt/slides/slide8.xml><?xml version="1.0" encoding="utf-8"?>
+<p:sld xmlns:a="http://schemas.openxmlformats.org/drawingml/2006/main" xmlns:r="http://schemas.openxmlformats.org/officeDocument/2006/relationships" xmlns:p="http://schemas.openxmlformats.org/presentationml/2006/main">
+  <p:cSld>
+    <p:spTree>
+      <p:nvGrpSpPr>
+        <p:cNvPr id="1" name=""/>
+        <p:cNvGrpSpPr/>
+        <p:nvPr/>
+      </p:nvGrpSpPr>
+      <p:grpSpPr>
+        <a:xfrm>
+          <a:off x="0" y="0"/>
+          <a:ext cx="0" cy="0"/>
+          <a:chOff x="0" y="0"/>
+          <a:chExt cx="0" cy="0"/>
+        </a:xfrm>
+      </p:grpSpPr>
+      <p:sp>
+        <p:nvSpPr>
+          <p:cNvPr id="2" name="Title 1">
+            <a:extLst>
+              <a:ext uri="{FF2B5EF4-FFF2-40B4-BE49-F238E27FC236}">
+                <a16:creationId xmlns:a16="http://schemas.microsoft.com/office/drawing/2014/main" id="{010B6E6D-5673-4318-ABB3-F275FB27A116}"/>
+              </a:ext>
+            </a:extLst>
+          </p:cNvPr>
+          <p:cNvSpPr>
+            <a:spLocks noGrp="1"/>
+          </p:cNvSpPr>
+          <p:nvPr>
+            <p:ph type="title"/>
+          </p:nvPr>
+        </p:nvSpPr>
+        <p:spPr/>
+        <p:txBody>
+          <a:bodyPr/>
+          <a:lstStyle/>
+          <a:p>
+            <a:r>
+              <a:rPr lang="en-SE" dirty="0" err="1"/>
+              <a:t>Programing</a:t>
+            </a:r>
+            <a:r>
+              <a:rPr lang="en-SE" dirty="0"/>
+              <a:t>- and temperature port</a:t>
+            </a:r>
+          </a:p>
+        </p:txBody>
+      </p:sp>
+      <p:sp>
+        <p:nvSpPr>
+          <p:cNvPr id="19" name="TextBox 18">
+            <a:extLst>
+              <a:ext uri="{FF2B5EF4-FFF2-40B4-BE49-F238E27FC236}">
+                <a16:creationId xmlns:a16="http://schemas.microsoft.com/office/drawing/2014/main" id="{69001CEF-C8EA-401C-942B-7A45817468D5}"/>
+              </a:ext>
+            </a:extLst>
+          </p:cNvPr>
+          <p:cNvSpPr txBox="1"/>
+          <p:nvPr/>
+        </p:nvSpPr>
+        <p:spPr>
+          <a:xfrm>
+            <a:off x="5079432" y="1255190"/>
+            <a:ext cx="625492" cy="369332"/>
+          </a:xfrm>
+          <a:prstGeom prst="rect">
+            <a:avLst/>
+          </a:prstGeom>
+          <a:noFill/>
+        </p:spPr>
+        <p:txBody>
+          <a:bodyPr wrap="none" rtlCol="0">
+            <a:spAutoFit/>
+          </a:bodyPr>
+          <a:lstStyle/>
+          <a:p>
+            <a:r>
+              <a:rPr lang="en-SE" b="1" dirty="0"/>
+              <a:t>RJ45</a:t>
+            </a:r>
+          </a:p>
+        </p:txBody>
+      </p:sp>
+      <p:sp>
+        <p:nvSpPr>
+          <p:cNvPr id="38" name="Oval 37">
+            <a:extLst>
+              <a:ext uri="{FF2B5EF4-FFF2-40B4-BE49-F238E27FC236}">
+                <a16:creationId xmlns:a16="http://schemas.microsoft.com/office/drawing/2014/main" id="{B6657B08-6829-40F1-8C2A-7B5E6FF4F7DD}"/>
+              </a:ext>
+            </a:extLst>
+          </p:cNvPr>
+          <p:cNvSpPr/>
+          <p:nvPr/>
+        </p:nvSpPr>
+        <p:spPr>
+          <a:xfrm>
+            <a:off x="7284719" y="3898901"/>
+            <a:ext cx="849631" cy="788244"/>
+          </a:xfrm>
+          <a:prstGeom prst="ellipse">
+            <a:avLst/>
+          </a:prstGeom>
+          <a:ln w="22225"/>
+        </p:spPr>
+        <p:style>
+          <a:lnRef idx="2">
+            <a:schemeClr val="accent1">
+              <a:shade val="50000"/>
+            </a:schemeClr>
+          </a:lnRef>
+          <a:fillRef idx="1">
+            <a:schemeClr val="accent1"/>
+          </a:fillRef>
+          <a:effectRef idx="0">
+            <a:schemeClr val="accent1"/>
+          </a:effectRef>
+          <a:fontRef idx="minor">
+            <a:schemeClr val="lt1"/>
+          </a:fontRef>
+        </p:style>
+        <p:txBody>
+          <a:bodyPr rtlCol="0" anchor="ctr"/>
+          <a:lstStyle/>
+          <a:p>
+            <a:pPr algn="ctr"/>
+            <a:endParaRPr lang="en-SE" dirty="0"/>
+          </a:p>
+        </p:txBody>
+      </p:sp>
+      <p:sp>
+        <p:nvSpPr>
+          <p:cNvPr id="39" name="Rectangle 38">
+            <a:extLst>
+              <a:ext uri="{FF2B5EF4-FFF2-40B4-BE49-F238E27FC236}">
+                <a16:creationId xmlns:a16="http://schemas.microsoft.com/office/drawing/2014/main" id="{7031F0A6-E707-4AA6-BF04-ED810553F366}"/>
+              </a:ext>
+            </a:extLst>
+          </p:cNvPr>
+          <p:cNvSpPr/>
+          <p:nvPr/>
+        </p:nvSpPr>
+        <p:spPr>
+          <a:xfrm>
+            <a:off x="7708053" y="3833707"/>
+            <a:ext cx="450426" cy="1029545"/>
+          </a:xfrm>
+          <a:prstGeom prst="rect">
+            <a:avLst/>
+          </a:prstGeom>
+          <a:solidFill>
+            <a:schemeClr val="bg1"/>
+          </a:solidFill>
+          <a:ln>
+            <a:noFill/>
+          </a:ln>
+        </p:spPr>
+        <p:style>
+          <a:lnRef idx="2">
+            <a:schemeClr val="accent1">
+              <a:shade val="50000"/>
+            </a:schemeClr>
+          </a:lnRef>
+          <a:fillRef idx="1">
+            <a:schemeClr val="accent1"/>
+          </a:fillRef>
+          <a:effectRef idx="0">
+            <a:schemeClr val="accent1"/>
+          </a:effectRef>
+          <a:fontRef idx="minor">
+            <a:schemeClr val="lt1"/>
+          </a:fontRef>
+        </p:style>
+        <p:txBody>
+          <a:bodyPr rtlCol="0" anchor="ctr"/>
+          <a:lstStyle/>
+          <a:p>
+            <a:pPr algn="ctr"/>
+            <a:endParaRPr lang="en-SE"/>
+          </a:p>
+        </p:txBody>
+      </p:sp>
+      <p:cxnSp>
+        <p:nvCxnSpPr>
+          <p:cNvPr id="41" name="Straight Connector 40">
+            <a:extLst>
+              <a:ext uri="{FF2B5EF4-FFF2-40B4-BE49-F238E27FC236}">
+                <a16:creationId xmlns:a16="http://schemas.microsoft.com/office/drawing/2014/main" id="{062177E7-A242-4024-8629-8648F544EA21}"/>
+              </a:ext>
+            </a:extLst>
+          </p:cNvPr>
+          <p:cNvCxnSpPr>
+            <a:cxnSpLocks/>
+            <a:endCxn id="38" idx="4"/>
+          </p:cNvCxnSpPr>
+          <p:nvPr/>
+        </p:nvCxnSpPr>
+        <p:spPr>
+          <a:xfrm>
+            <a:off x="7709535" y="3898901"/>
+            <a:ext cx="0" cy="788244"/>
+          </a:xfrm>
+          <a:prstGeom prst="line">
+            <a:avLst/>
+          </a:prstGeom>
+          <a:ln w="15875">
+            <a:solidFill>
+              <a:schemeClr val="tx1"/>
+            </a:solidFill>
+          </a:ln>
+        </p:spPr>
+        <p:style>
+          <a:lnRef idx="1">
+            <a:schemeClr val="accent1"/>
+          </a:lnRef>
+          <a:fillRef idx="0">
+            <a:schemeClr val="accent1"/>
+          </a:fillRef>
+          <a:effectRef idx="0">
+            <a:schemeClr val="accent1"/>
+          </a:effectRef>
+          <a:fontRef idx="minor">
+            <a:schemeClr val="tx1"/>
+          </a:fontRef>
+        </p:style>
+      </p:cxnSp>
+      <p:sp>
+        <p:nvSpPr>
+          <p:cNvPr id="50" name="TextBox 49">
+            <a:extLst>
+              <a:ext uri="{FF2B5EF4-FFF2-40B4-BE49-F238E27FC236}">
+                <a16:creationId xmlns:a16="http://schemas.microsoft.com/office/drawing/2014/main" id="{4AC91A69-6773-4992-A308-F09C68B116B3}"/>
+              </a:ext>
+            </a:extLst>
+          </p:cNvPr>
+          <p:cNvSpPr txBox="1"/>
+          <p:nvPr/>
+        </p:nvSpPr>
+        <p:spPr>
+          <a:xfrm rot="16200000">
+            <a:off x="7425341" y="4174985"/>
+            <a:ext cx="747320" cy="276999"/>
+          </a:xfrm>
+          <a:prstGeom prst="rect">
+            <a:avLst/>
+          </a:prstGeom>
+          <a:noFill/>
+        </p:spPr>
+        <p:txBody>
+          <a:bodyPr wrap="none" rtlCol="0">
+            <a:spAutoFit/>
+          </a:bodyPr>
+          <a:lstStyle/>
+          <a:p>
+            <a:r>
+              <a:rPr lang="en-SE" sz="1200" dirty="0"/>
+              <a:t>DS18B20</a:t>
+            </a:r>
+          </a:p>
+        </p:txBody>
+      </p:sp>
+      <p:sp>
+        <p:nvSpPr>
+          <p:cNvPr id="51" name="TextBox 50">
+            <a:extLst>
+              <a:ext uri="{FF2B5EF4-FFF2-40B4-BE49-F238E27FC236}">
+                <a16:creationId xmlns:a16="http://schemas.microsoft.com/office/drawing/2014/main" id="{F77FE29D-7545-4FDE-BB90-D91DBF8BBC24}"/>
+              </a:ext>
+            </a:extLst>
+          </p:cNvPr>
+          <p:cNvSpPr txBox="1"/>
+          <p:nvPr/>
+        </p:nvSpPr>
+        <p:spPr>
+          <a:xfrm>
+            <a:off x="7336053" y="3963131"/>
+            <a:ext cx="255198" cy="261610"/>
+          </a:xfrm>
+          <a:prstGeom prst="rect">
+            <a:avLst/>
+          </a:prstGeom>
+          <a:noFill/>
+        </p:spPr>
+        <p:txBody>
+          <a:bodyPr wrap="none" rtlCol="0">
+            <a:spAutoFit/>
+          </a:bodyPr>
+          <a:lstStyle/>
+          <a:p>
+            <a:r>
+              <a:rPr lang="en-SE" sz="1100" dirty="0"/>
+              <a:t>+</a:t>
+            </a:r>
+          </a:p>
+        </p:txBody>
+      </p:sp>
+      <p:sp>
+        <p:nvSpPr>
+          <p:cNvPr id="52" name="TextBox 51">
+            <a:extLst>
+              <a:ext uri="{FF2B5EF4-FFF2-40B4-BE49-F238E27FC236}">
+                <a16:creationId xmlns:a16="http://schemas.microsoft.com/office/drawing/2014/main" id="{16B9366F-D155-4546-AD21-DD6E910D8770}"/>
+              </a:ext>
+            </a:extLst>
+          </p:cNvPr>
+          <p:cNvSpPr txBox="1"/>
+          <p:nvPr/>
+        </p:nvSpPr>
+        <p:spPr>
+          <a:xfrm>
+            <a:off x="7284719" y="4158166"/>
+            <a:ext cx="452368" cy="261610"/>
+          </a:xfrm>
+          <a:prstGeom prst="rect">
+            <a:avLst/>
+          </a:prstGeom>
+          <a:noFill/>
+        </p:spPr>
+        <p:txBody>
+          <a:bodyPr wrap="none" rtlCol="0">
+            <a:spAutoFit/>
+          </a:bodyPr>
+          <a:lstStyle/>
+          <a:p>
+            <a:r>
+              <a:rPr lang="en-SE" sz="1100" dirty="0"/>
+              <a:t>Data</a:t>
+            </a:r>
+          </a:p>
+        </p:txBody>
+      </p:sp>
+      <p:sp>
+        <p:nvSpPr>
+          <p:cNvPr id="53" name="TextBox 52">
+            <a:extLst>
+              <a:ext uri="{FF2B5EF4-FFF2-40B4-BE49-F238E27FC236}">
+                <a16:creationId xmlns:a16="http://schemas.microsoft.com/office/drawing/2014/main" id="{DE2341CC-717B-42C2-ABBE-138B64886104}"/>
+              </a:ext>
+            </a:extLst>
+          </p:cNvPr>
+          <p:cNvSpPr txBox="1"/>
+          <p:nvPr/>
+        </p:nvSpPr>
+        <p:spPr>
+          <a:xfrm>
+            <a:off x="7336053" y="4334508"/>
+            <a:ext cx="227948" cy="261610"/>
+          </a:xfrm>
+          <a:prstGeom prst="rect">
+            <a:avLst/>
+          </a:prstGeom>
+          <a:noFill/>
+        </p:spPr>
+        <p:txBody>
+          <a:bodyPr wrap="none" rtlCol="0">
+            <a:spAutoFit/>
+          </a:bodyPr>
+          <a:lstStyle/>
+          <a:p>
+            <a:r>
+              <a:rPr lang="en-SE" sz="1100" dirty="0"/>
+              <a:t>-</a:t>
+            </a:r>
+          </a:p>
+        </p:txBody>
+      </p:sp>
+      <p:cxnSp>
+        <p:nvCxnSpPr>
+          <p:cNvPr id="55" name="Connector: Elbow 54">
+            <a:extLst>
+              <a:ext uri="{FF2B5EF4-FFF2-40B4-BE49-F238E27FC236}">
+                <a16:creationId xmlns:a16="http://schemas.microsoft.com/office/drawing/2014/main" id="{A3D55537-1E46-4C7E-86B0-501C09382344}"/>
+              </a:ext>
+            </a:extLst>
+          </p:cNvPr>
+          <p:cNvCxnSpPr>
+            <a:stCxn id="37" idx="1"/>
+            <a:endCxn id="51" idx="1"/>
+          </p:cNvCxnSpPr>
+          <p:nvPr/>
+        </p:nvCxnSpPr>
+        <p:spPr>
+          <a:xfrm rot="16200000" flipH="1">
+            <a:off x="5783035" y="2540917"/>
+            <a:ext cx="2029545" cy="1076492"/>
+          </a:xfrm>
+          <a:prstGeom prst="bentConnector2">
+            <a:avLst/>
+          </a:prstGeom>
+        </p:spPr>
+        <p:style>
+          <a:lnRef idx="1">
+            <a:schemeClr val="accent1"/>
+          </a:lnRef>
+          <a:fillRef idx="0">
+            <a:schemeClr val="accent1"/>
+          </a:fillRef>
+          <a:effectRef idx="0">
+            <a:schemeClr val="accent1"/>
+          </a:effectRef>
+          <a:fontRef idx="minor">
+            <a:schemeClr val="tx1"/>
+          </a:fontRef>
+        </p:style>
+      </p:cxnSp>
+      <p:cxnSp>
+        <p:nvCxnSpPr>
+          <p:cNvPr id="57" name="Connector: Elbow 56">
+            <a:extLst>
+              <a:ext uri="{FF2B5EF4-FFF2-40B4-BE49-F238E27FC236}">
+                <a16:creationId xmlns:a16="http://schemas.microsoft.com/office/drawing/2014/main" id="{20A6D949-D921-428E-8706-AAFE568406F9}"/>
+              </a:ext>
+            </a:extLst>
+          </p:cNvPr>
+          <p:cNvCxnSpPr>
+            <a:stCxn id="36" idx="1"/>
+            <a:endCxn id="52" idx="1"/>
+          </p:cNvCxnSpPr>
+          <p:nvPr/>
+        </p:nvCxnSpPr>
+        <p:spPr>
+          <a:xfrm rot="16200000" flipH="1">
+            <a:off x="5532492" y="2536744"/>
+            <a:ext cx="2224580" cy="1279874"/>
+          </a:xfrm>
+          <a:prstGeom prst="bentConnector2">
+            <a:avLst/>
+          </a:prstGeom>
+        </p:spPr>
+        <p:style>
+          <a:lnRef idx="1">
+            <a:schemeClr val="accent1"/>
+          </a:lnRef>
+          <a:fillRef idx="0">
+            <a:schemeClr val="accent1"/>
+          </a:fillRef>
+          <a:effectRef idx="0">
+            <a:schemeClr val="accent1"/>
+          </a:effectRef>
+          <a:fontRef idx="minor">
+            <a:schemeClr val="tx1"/>
+          </a:fontRef>
+        </p:style>
+      </p:cxnSp>
+      <p:cxnSp>
+        <p:nvCxnSpPr>
+          <p:cNvPr id="59" name="Connector: Elbow 58">
+            <a:extLst>
+              <a:ext uri="{FF2B5EF4-FFF2-40B4-BE49-F238E27FC236}">
+                <a16:creationId xmlns:a16="http://schemas.microsoft.com/office/drawing/2014/main" id="{A79F3C98-AB9F-436C-A0DE-5E95613EA072}"/>
+              </a:ext>
+            </a:extLst>
+          </p:cNvPr>
+          <p:cNvCxnSpPr>
+            <a:stCxn id="35" idx="1"/>
+            <a:endCxn id="53" idx="1"/>
+          </p:cNvCxnSpPr>
+          <p:nvPr/>
+        </p:nvCxnSpPr>
+        <p:spPr>
+          <a:xfrm rot="16200000" flipH="1">
+            <a:off x="5342629" y="2471889"/>
+            <a:ext cx="2400922" cy="1585926"/>
+          </a:xfrm>
+          <a:prstGeom prst="bentConnector2">
+            <a:avLst/>
+          </a:prstGeom>
+        </p:spPr>
+        <p:style>
+          <a:lnRef idx="1">
+            <a:schemeClr val="accent1"/>
+          </a:lnRef>
+          <a:fillRef idx="0">
+            <a:schemeClr val="accent1"/>
+          </a:fillRef>
+          <a:effectRef idx="0">
+            <a:schemeClr val="accent1"/>
+          </a:effectRef>
+          <a:fontRef idx="minor">
+            <a:schemeClr val="tx1"/>
+          </a:fontRef>
+        </p:style>
+      </p:cxnSp>
+      <p:sp>
+        <p:nvSpPr>
+          <p:cNvPr id="60" name="Rectangle 59">
+            <a:extLst>
+              <a:ext uri="{FF2B5EF4-FFF2-40B4-BE49-F238E27FC236}">
+                <a16:creationId xmlns:a16="http://schemas.microsoft.com/office/drawing/2014/main" id="{0356D306-8438-4EE5-96B2-9DC8B003CE41}"/>
+              </a:ext>
+            </a:extLst>
+          </p:cNvPr>
+          <p:cNvSpPr/>
+          <p:nvPr/>
+        </p:nvSpPr>
+        <p:spPr>
+          <a:xfrm>
+            <a:off x="4248120" y="5368814"/>
+            <a:ext cx="1528305" cy="154633"/>
+          </a:xfrm>
+          <a:prstGeom prst="rect">
+            <a:avLst/>
+          </a:prstGeom>
+        </p:spPr>
+        <p:style>
+          <a:lnRef idx="2">
+            <a:schemeClr val="accent1">
+              <a:shade val="50000"/>
+            </a:schemeClr>
+          </a:lnRef>
+          <a:fillRef idx="1">
+            <a:schemeClr val="accent1"/>
+          </a:fillRef>
+          <a:effectRef idx="0">
+            <a:schemeClr val="accent1"/>
+          </a:effectRef>
+          <a:fontRef idx="minor">
+            <a:schemeClr val="lt1"/>
+          </a:fontRef>
+        </p:style>
+        <p:txBody>
+          <a:bodyPr rtlCol="0" anchor="ctr"/>
+          <a:lstStyle/>
+          <a:p>
+            <a:pPr algn="ctr"/>
+            <a:endParaRPr lang="en-SE"/>
+          </a:p>
+        </p:txBody>
+      </p:sp>
+      <p:cxnSp>
+        <p:nvCxnSpPr>
+          <p:cNvPr id="64" name="Straight Connector 63">
+            <a:extLst>
+              <a:ext uri="{FF2B5EF4-FFF2-40B4-BE49-F238E27FC236}">
+                <a16:creationId xmlns:a16="http://schemas.microsoft.com/office/drawing/2014/main" id="{139C1524-5017-4B1C-9869-DD8D9600CC40}"/>
+              </a:ext>
+            </a:extLst>
+          </p:cNvPr>
+          <p:cNvCxnSpPr>
+            <a:cxnSpLocks/>
+            <a:stCxn id="24" idx="1"/>
+          </p:cNvCxnSpPr>
+          <p:nvPr/>
+        </p:nvCxnSpPr>
+        <p:spPr>
+          <a:xfrm>
+            <a:off x="4476537" y="2064391"/>
+            <a:ext cx="0" cy="3304423"/>
+          </a:xfrm>
+          <a:prstGeom prst="line">
+            <a:avLst/>
+          </a:prstGeom>
+        </p:spPr>
+        <p:style>
+          <a:lnRef idx="1">
+            <a:schemeClr val="accent1"/>
+          </a:lnRef>
+          <a:fillRef idx="0">
+            <a:schemeClr val="accent1"/>
+          </a:fillRef>
+          <a:effectRef idx="0">
+            <a:schemeClr val="accent1"/>
+          </a:effectRef>
+          <a:fontRef idx="minor">
+            <a:schemeClr val="tx1"/>
+          </a:fontRef>
+        </p:style>
+      </p:cxnSp>
+      <p:cxnSp>
+        <p:nvCxnSpPr>
+          <p:cNvPr id="66" name="Straight Connector 65">
+            <a:extLst>
+              <a:ext uri="{FF2B5EF4-FFF2-40B4-BE49-F238E27FC236}">
+                <a16:creationId xmlns:a16="http://schemas.microsoft.com/office/drawing/2014/main" id="{43C9C55A-95FA-4815-A139-3590E8FE13B5}"/>
+              </a:ext>
+            </a:extLst>
+          </p:cNvPr>
+          <p:cNvCxnSpPr>
+            <a:cxnSpLocks/>
+            <a:stCxn id="31" idx="1"/>
+          </p:cNvCxnSpPr>
+          <p:nvPr/>
+        </p:nvCxnSpPr>
+        <p:spPr>
+          <a:xfrm>
+            <a:off x="4731255" y="2064391"/>
+            <a:ext cx="0" cy="3381739"/>
+          </a:xfrm>
+          <a:prstGeom prst="line">
+            <a:avLst/>
+          </a:prstGeom>
+        </p:spPr>
+        <p:style>
+          <a:lnRef idx="1">
+            <a:schemeClr val="accent1"/>
+          </a:lnRef>
+          <a:fillRef idx="0">
+            <a:schemeClr val="accent1"/>
+          </a:fillRef>
+          <a:effectRef idx="0">
+            <a:schemeClr val="accent1"/>
+          </a:effectRef>
+          <a:fontRef idx="minor">
+            <a:schemeClr val="tx1"/>
+          </a:fontRef>
+        </p:style>
+      </p:cxnSp>
+      <p:cxnSp>
+        <p:nvCxnSpPr>
+          <p:cNvPr id="68" name="Straight Connector 67">
+            <a:extLst>
+              <a:ext uri="{FF2B5EF4-FFF2-40B4-BE49-F238E27FC236}">
+                <a16:creationId xmlns:a16="http://schemas.microsoft.com/office/drawing/2014/main" id="{36432C35-338F-4764-8E7C-EE3BC0D8E7A0}"/>
+              </a:ext>
+            </a:extLst>
+          </p:cNvPr>
+          <p:cNvCxnSpPr>
+            <a:cxnSpLocks/>
+            <a:stCxn id="32" idx="1"/>
+          </p:cNvCxnSpPr>
+          <p:nvPr/>
+        </p:nvCxnSpPr>
+        <p:spPr>
+          <a:xfrm>
+            <a:off x="4985973" y="2064391"/>
+            <a:ext cx="0" cy="3381739"/>
+          </a:xfrm>
+          <a:prstGeom prst="line">
+            <a:avLst/>
+          </a:prstGeom>
+        </p:spPr>
+        <p:style>
+          <a:lnRef idx="1">
+            <a:schemeClr val="accent1"/>
+          </a:lnRef>
+          <a:fillRef idx="0">
+            <a:schemeClr val="accent1"/>
+          </a:fillRef>
+          <a:effectRef idx="0">
+            <a:schemeClr val="accent1"/>
+          </a:effectRef>
+          <a:fontRef idx="minor">
+            <a:schemeClr val="tx1"/>
+          </a:fontRef>
+        </p:style>
+      </p:cxnSp>
+      <p:cxnSp>
+        <p:nvCxnSpPr>
+          <p:cNvPr id="70" name="Straight Connector 69">
+            <a:extLst>
+              <a:ext uri="{FF2B5EF4-FFF2-40B4-BE49-F238E27FC236}">
+                <a16:creationId xmlns:a16="http://schemas.microsoft.com/office/drawing/2014/main" id="{358E256C-63F1-46CA-A686-232966D87C67}"/>
+              </a:ext>
+            </a:extLst>
+          </p:cNvPr>
+          <p:cNvCxnSpPr>
+            <a:cxnSpLocks/>
+            <a:stCxn id="33" idx="1"/>
+          </p:cNvCxnSpPr>
+          <p:nvPr/>
+        </p:nvCxnSpPr>
+        <p:spPr>
+          <a:xfrm flipH="1">
+            <a:off x="5222720" y="2064391"/>
+            <a:ext cx="17971" cy="3381739"/>
+          </a:xfrm>
+          <a:prstGeom prst="line">
+            <a:avLst/>
+          </a:prstGeom>
+        </p:spPr>
+        <p:style>
+          <a:lnRef idx="1">
+            <a:schemeClr val="accent1"/>
+          </a:lnRef>
+          <a:fillRef idx="0">
+            <a:schemeClr val="accent1"/>
+          </a:fillRef>
+          <a:effectRef idx="0">
+            <a:schemeClr val="accent1"/>
+          </a:effectRef>
+          <a:fontRef idx="minor">
+            <a:schemeClr val="tx1"/>
+          </a:fontRef>
+        </p:style>
+      </p:cxnSp>
+      <p:cxnSp>
+        <p:nvCxnSpPr>
+          <p:cNvPr id="72" name="Straight Connector 71">
+            <a:extLst>
+              <a:ext uri="{FF2B5EF4-FFF2-40B4-BE49-F238E27FC236}">
+                <a16:creationId xmlns:a16="http://schemas.microsoft.com/office/drawing/2014/main" id="{FA7562DB-B7CA-4464-9400-29B2937CE3DF}"/>
+              </a:ext>
+            </a:extLst>
+          </p:cNvPr>
+          <p:cNvCxnSpPr>
+            <a:cxnSpLocks/>
+            <a:stCxn id="34" idx="1"/>
+          </p:cNvCxnSpPr>
+          <p:nvPr/>
+        </p:nvCxnSpPr>
+        <p:spPr>
+          <a:xfrm>
+            <a:off x="5495409" y="2064391"/>
+            <a:ext cx="0" cy="3304423"/>
+          </a:xfrm>
+          <a:prstGeom prst="line">
+            <a:avLst/>
+          </a:prstGeom>
+        </p:spPr>
+        <p:style>
+          <a:lnRef idx="1">
+            <a:schemeClr val="accent1"/>
+          </a:lnRef>
+          <a:fillRef idx="0">
+            <a:schemeClr val="accent1"/>
+          </a:fillRef>
+          <a:effectRef idx="0">
+            <a:schemeClr val="accent1"/>
+          </a:effectRef>
+          <a:fontRef idx="minor">
+            <a:schemeClr val="tx1"/>
+          </a:fontRef>
+        </p:style>
+      </p:cxnSp>
+      <p:sp>
+        <p:nvSpPr>
+          <p:cNvPr id="76" name="TextBox 75">
+            <a:extLst>
+              <a:ext uri="{FF2B5EF4-FFF2-40B4-BE49-F238E27FC236}">
+                <a16:creationId xmlns:a16="http://schemas.microsoft.com/office/drawing/2014/main" id="{D3C5B6FE-6376-4A2F-B75C-15ADA8FA7D08}"/>
+              </a:ext>
+            </a:extLst>
+          </p:cNvPr>
+          <p:cNvSpPr txBox="1"/>
+          <p:nvPr/>
+        </p:nvSpPr>
+        <p:spPr>
+          <a:xfrm rot="16200000">
+            <a:off x="4224076" y="5557935"/>
+            <a:ext cx="394660" cy="246221"/>
+          </a:xfrm>
+          <a:prstGeom prst="rect">
+            <a:avLst/>
+          </a:prstGeom>
+          <a:noFill/>
+        </p:spPr>
+        <p:txBody>
+          <a:bodyPr wrap="none" rtlCol="0">
+            <a:spAutoFit/>
+          </a:bodyPr>
+          <a:lstStyle/>
+          <a:p>
+            <a:r>
+              <a:rPr lang="en-SE" sz="1000" dirty="0"/>
+              <a:t>DTR</a:t>
+            </a:r>
+          </a:p>
+        </p:txBody>
+      </p:sp>
+      <p:sp>
+        <p:nvSpPr>
+          <p:cNvPr id="77" name="TextBox 76">
+            <a:extLst>
+              <a:ext uri="{FF2B5EF4-FFF2-40B4-BE49-F238E27FC236}">
+                <a16:creationId xmlns:a16="http://schemas.microsoft.com/office/drawing/2014/main" id="{6B03E011-1C82-4654-B65E-EB2C62E3E7BD}"/>
+              </a:ext>
+            </a:extLst>
+          </p:cNvPr>
+          <p:cNvSpPr txBox="1"/>
+          <p:nvPr/>
+        </p:nvSpPr>
+        <p:spPr>
+          <a:xfrm rot="16200000">
+            <a:off x="4482000" y="5557935"/>
+            <a:ext cx="388248" cy="246221"/>
+          </a:xfrm>
+          <a:prstGeom prst="rect">
+            <a:avLst/>
+          </a:prstGeom>
+          <a:noFill/>
+        </p:spPr>
+        <p:txBody>
+          <a:bodyPr wrap="none" rtlCol="0">
+            <a:spAutoFit/>
+          </a:bodyPr>
+          <a:lstStyle/>
+          <a:p>
+            <a:r>
+              <a:rPr lang="en-SE" sz="1000" dirty="0" err="1"/>
+              <a:t>RxD</a:t>
+            </a:r>
+            <a:endParaRPr lang="en-SE" sz="1000" dirty="0"/>
+          </a:p>
+        </p:txBody>
+      </p:sp>
+      <p:sp>
+        <p:nvSpPr>
+          <p:cNvPr id="78" name="TextBox 77">
+            <a:extLst>
+              <a:ext uri="{FF2B5EF4-FFF2-40B4-BE49-F238E27FC236}">
+                <a16:creationId xmlns:a16="http://schemas.microsoft.com/office/drawing/2014/main" id="{5ADD5152-858E-4F3A-BCA6-EBB7FDC82D5F}"/>
+              </a:ext>
+            </a:extLst>
+          </p:cNvPr>
+          <p:cNvSpPr txBox="1"/>
+          <p:nvPr/>
+        </p:nvSpPr>
+        <p:spPr>
+          <a:xfrm rot="16200000">
+            <a:off x="4744733" y="5557935"/>
+            <a:ext cx="372218" cy="246221"/>
+          </a:xfrm>
+          <a:prstGeom prst="rect">
+            <a:avLst/>
+          </a:prstGeom>
+          <a:noFill/>
+        </p:spPr>
+        <p:txBody>
+          <a:bodyPr wrap="none" rtlCol="0">
+            <a:spAutoFit/>
+          </a:bodyPr>
+          <a:lstStyle/>
+          <a:p>
+            <a:r>
+              <a:rPr lang="en-SE" sz="1000" dirty="0" err="1"/>
+              <a:t>RxT</a:t>
+            </a:r>
+            <a:endParaRPr lang="en-SE" sz="1000" dirty="0"/>
+          </a:p>
+        </p:txBody>
+      </p:sp>
+      <p:sp>
+        <p:nvSpPr>
+          <p:cNvPr id="79" name="TextBox 78">
+            <a:extLst>
+              <a:ext uri="{FF2B5EF4-FFF2-40B4-BE49-F238E27FC236}">
+                <a16:creationId xmlns:a16="http://schemas.microsoft.com/office/drawing/2014/main" id="{91AE066C-7993-4802-9C4B-3DBA32DAC7BA}"/>
+              </a:ext>
+            </a:extLst>
+          </p:cNvPr>
+          <p:cNvSpPr txBox="1"/>
+          <p:nvPr/>
+        </p:nvSpPr>
+        <p:spPr>
+          <a:xfrm rot="16200000">
+            <a:off x="4988230" y="5557935"/>
+            <a:ext cx="394660" cy="246221"/>
+          </a:xfrm>
+          <a:prstGeom prst="rect">
+            <a:avLst/>
+          </a:prstGeom>
+          <a:noFill/>
+        </p:spPr>
+        <p:txBody>
+          <a:bodyPr wrap="none" rtlCol="0">
+            <a:spAutoFit/>
+          </a:bodyPr>
+          <a:lstStyle/>
+          <a:p>
+            <a:r>
+              <a:rPr lang="en-SE" sz="1000" dirty="0"/>
+              <a:t>VCC</a:t>
+            </a:r>
+          </a:p>
+        </p:txBody>
+      </p:sp>
+      <p:sp>
+        <p:nvSpPr>
+          <p:cNvPr id="80" name="TextBox 79">
+            <a:extLst>
+              <a:ext uri="{FF2B5EF4-FFF2-40B4-BE49-F238E27FC236}">
+                <a16:creationId xmlns:a16="http://schemas.microsoft.com/office/drawing/2014/main" id="{84F9F78E-3649-4A47-9671-0797ADFEA713}"/>
+              </a:ext>
+            </a:extLst>
+          </p:cNvPr>
+          <p:cNvSpPr txBox="1"/>
+          <p:nvPr/>
+        </p:nvSpPr>
+        <p:spPr>
+          <a:xfrm rot="16200000">
+            <a:off x="5252566" y="5557935"/>
+            <a:ext cx="375424" cy="246221"/>
+          </a:xfrm>
+          <a:prstGeom prst="rect">
+            <a:avLst/>
+          </a:prstGeom>
+          <a:noFill/>
+        </p:spPr>
+        <p:txBody>
+          <a:bodyPr wrap="none" rtlCol="0">
+            <a:spAutoFit/>
+          </a:bodyPr>
+          <a:lstStyle/>
+          <a:p>
+            <a:r>
+              <a:rPr lang="en-SE" sz="1000" dirty="0"/>
+              <a:t>CTS</a:t>
+            </a:r>
+          </a:p>
+        </p:txBody>
+      </p:sp>
+      <p:sp>
+        <p:nvSpPr>
+          <p:cNvPr id="81" name="TextBox 80">
+            <a:extLst>
+              <a:ext uri="{FF2B5EF4-FFF2-40B4-BE49-F238E27FC236}">
+                <a16:creationId xmlns:a16="http://schemas.microsoft.com/office/drawing/2014/main" id="{75FFD175-3E8E-4391-8550-4A84CA2632A3}"/>
+              </a:ext>
+            </a:extLst>
+          </p:cNvPr>
+          <p:cNvSpPr txBox="1"/>
+          <p:nvPr/>
+        </p:nvSpPr>
+        <p:spPr>
+          <a:xfrm rot="16200000">
+            <a:off x="5481636" y="5557935"/>
+            <a:ext cx="426720" cy="246221"/>
+          </a:xfrm>
+          <a:prstGeom prst="rect">
+            <a:avLst/>
+          </a:prstGeom>
+          <a:noFill/>
+        </p:spPr>
+        <p:txBody>
+          <a:bodyPr wrap="none" rtlCol="0">
+            <a:spAutoFit/>
+          </a:bodyPr>
+          <a:lstStyle/>
+          <a:p>
+            <a:r>
+              <a:rPr lang="en-SE" sz="1000" dirty="0"/>
+              <a:t>GND</a:t>
+            </a:r>
+          </a:p>
+        </p:txBody>
+      </p:sp>
+      <p:grpSp>
+        <p:nvGrpSpPr>
+          <p:cNvPr id="100" name="Group 99">
+            <a:extLst>
+              <a:ext uri="{FF2B5EF4-FFF2-40B4-BE49-F238E27FC236}">
+                <a16:creationId xmlns:a16="http://schemas.microsoft.com/office/drawing/2014/main" id="{A4C5874D-7390-445B-8EF1-7A59B81F9374}"/>
+              </a:ext>
+            </a:extLst>
+          </p:cNvPr>
+          <p:cNvGrpSpPr/>
+          <p:nvPr/>
+        </p:nvGrpSpPr>
+        <p:grpSpPr>
+          <a:xfrm>
+            <a:off x="4342015" y="1547747"/>
+            <a:ext cx="4190006" cy="1498654"/>
+            <a:chOff x="4342015" y="1547747"/>
+            <a:chExt cx="4190006" cy="1498654"/>
+          </a:xfrm>
+        </p:grpSpPr>
+        <p:sp>
+          <p:nvSpPr>
+            <p:cNvPr id="3" name="Rectangle 2">
+              <a:extLst>
+                <a:ext uri="{FF2B5EF4-FFF2-40B4-BE49-F238E27FC236}">
+                  <a16:creationId xmlns:a16="http://schemas.microsoft.com/office/drawing/2014/main" id="{4031F298-7E32-4139-A48A-CCCE45E3D209}"/>
+                </a:ext>
+              </a:extLst>
+            </p:cNvPr>
+            <p:cNvSpPr/>
+            <p:nvPr/>
+          </p:nvSpPr>
+          <p:spPr>
+            <a:xfrm>
+              <a:off x="4342015" y="1547747"/>
+              <a:ext cx="2036990" cy="1314639"/>
+            </a:xfrm>
+            <a:prstGeom prst="rect">
+              <a:avLst/>
+            </a:prstGeom>
+          </p:spPr>
+          <p:style>
+            <a:lnRef idx="2">
+              <a:schemeClr val="accent1">
+                <a:shade val="50000"/>
+              </a:schemeClr>
+            </a:lnRef>
+            <a:fillRef idx="1">
+              <a:schemeClr val="accent1"/>
+            </a:fillRef>
+            <a:effectRef idx="0">
+              <a:schemeClr val="accent1"/>
+            </a:effectRef>
+            <a:fontRef idx="minor">
+              <a:schemeClr val="lt1"/>
+            </a:fontRef>
+          </p:style>
+          <p:txBody>
+            <a:bodyPr rtlCol="0" anchor="ctr"/>
+            <a:lstStyle/>
+            <a:p>
+              <a:pPr algn="ctr"/>
+              <a:endParaRPr lang="en-SE"/>
+            </a:p>
+          </p:txBody>
+        </p:sp>
+        <p:cxnSp>
+          <p:nvCxnSpPr>
+            <p:cNvPr id="10" name="Straight Connector 9">
+              <a:extLst>
+                <a:ext uri="{FF2B5EF4-FFF2-40B4-BE49-F238E27FC236}">
+                  <a16:creationId xmlns:a16="http://schemas.microsoft.com/office/drawing/2014/main" id="{D6035D58-3B38-4A37-ADD3-D9BB299F484B}"/>
+                </a:ext>
+              </a:extLst>
+            </p:cNvPr>
+            <p:cNvCxnSpPr>
+              <a:cxnSpLocks/>
+            </p:cNvCxnSpPr>
+            <p:nvPr/>
+          </p:nvCxnSpPr>
+          <p:spPr>
+            <a:xfrm>
+              <a:off x="4454932" y="1992013"/>
+              <a:ext cx="1" cy="870373"/>
+            </a:xfrm>
+            <a:prstGeom prst="line">
+              <a:avLst/>
+            </a:prstGeom>
+            <a:ln w="82550">
+              <a:solidFill>
+                <a:srgbClr val="FFC000"/>
+              </a:solidFill>
+            </a:ln>
+          </p:spPr>
+          <p:style>
+            <a:lnRef idx="1">
+              <a:schemeClr val="accent1"/>
+            </a:lnRef>
+            <a:fillRef idx="0">
+              <a:schemeClr val="accent1"/>
+            </a:fillRef>
+            <a:effectRef idx="0">
+              <a:schemeClr val="accent1"/>
+            </a:effectRef>
+            <a:fontRef idx="minor">
+              <a:schemeClr val="tx1"/>
+            </a:fontRef>
+          </p:style>
+        </p:cxnSp>
+        <p:cxnSp>
+          <p:nvCxnSpPr>
+            <p:cNvPr id="12" name="Straight Connector 11">
+              <a:extLst>
+                <a:ext uri="{FF2B5EF4-FFF2-40B4-BE49-F238E27FC236}">
+                  <a16:creationId xmlns:a16="http://schemas.microsoft.com/office/drawing/2014/main" id="{72D7B8DA-F42C-48B4-A11F-54127138C36C}"/>
+                </a:ext>
+              </a:extLst>
+            </p:cNvPr>
+            <p:cNvCxnSpPr>
+              <a:cxnSpLocks/>
+            </p:cNvCxnSpPr>
+            <p:nvPr/>
+          </p:nvCxnSpPr>
+          <p:spPr>
+            <a:xfrm>
+              <a:off x="4713770" y="1992013"/>
+              <a:ext cx="1" cy="870373"/>
+            </a:xfrm>
+            <a:prstGeom prst="line">
+              <a:avLst/>
+            </a:prstGeom>
+            <a:ln w="82550">
+              <a:solidFill>
+                <a:srgbClr val="FFC000"/>
+              </a:solidFill>
+            </a:ln>
+          </p:spPr>
+          <p:style>
+            <a:lnRef idx="1">
+              <a:schemeClr val="accent1"/>
+            </a:lnRef>
+            <a:fillRef idx="0">
+              <a:schemeClr val="accent1"/>
+            </a:fillRef>
+            <a:effectRef idx="0">
+              <a:schemeClr val="accent1"/>
+            </a:effectRef>
+            <a:fontRef idx="minor">
+              <a:schemeClr val="tx1"/>
+            </a:fontRef>
+          </p:style>
+        </p:cxnSp>
+        <p:cxnSp>
+          <p:nvCxnSpPr>
+            <p:cNvPr id="13" name="Straight Connector 12">
+              <a:extLst>
+                <a:ext uri="{FF2B5EF4-FFF2-40B4-BE49-F238E27FC236}">
+                  <a16:creationId xmlns:a16="http://schemas.microsoft.com/office/drawing/2014/main" id="{C8B5F56F-BF60-4D87-B641-34506FC3DF46}"/>
+                </a:ext>
+              </a:extLst>
+            </p:cNvPr>
+            <p:cNvCxnSpPr>
+              <a:cxnSpLocks/>
+            </p:cNvCxnSpPr>
+            <p:nvPr/>
+          </p:nvCxnSpPr>
+          <p:spPr>
+            <a:xfrm>
+              <a:off x="4972608" y="1992013"/>
+              <a:ext cx="1" cy="870373"/>
+            </a:xfrm>
+            <a:prstGeom prst="line">
+              <a:avLst/>
+            </a:prstGeom>
+            <a:ln w="82550">
+              <a:solidFill>
+                <a:srgbClr val="FFC000"/>
+              </a:solidFill>
+            </a:ln>
+          </p:spPr>
+          <p:style>
+            <a:lnRef idx="1">
+              <a:schemeClr val="accent1"/>
+            </a:lnRef>
+            <a:fillRef idx="0">
+              <a:schemeClr val="accent1"/>
+            </a:fillRef>
+            <a:effectRef idx="0">
+              <a:schemeClr val="accent1"/>
+            </a:effectRef>
+            <a:fontRef idx="minor">
+              <a:schemeClr val="tx1"/>
+            </a:fontRef>
+          </p:style>
+        </p:cxnSp>
+        <p:cxnSp>
+          <p:nvCxnSpPr>
+            <p:cNvPr id="14" name="Straight Connector 13">
+              <a:extLst>
+                <a:ext uri="{FF2B5EF4-FFF2-40B4-BE49-F238E27FC236}">
+                  <a16:creationId xmlns:a16="http://schemas.microsoft.com/office/drawing/2014/main" id="{FA81410A-35F5-4259-9F5F-1273843FE5D8}"/>
+                </a:ext>
+              </a:extLst>
+            </p:cNvPr>
+            <p:cNvCxnSpPr>
+              <a:cxnSpLocks/>
+            </p:cNvCxnSpPr>
+            <p:nvPr/>
+          </p:nvCxnSpPr>
+          <p:spPr>
+            <a:xfrm>
+              <a:off x="5231446" y="1992013"/>
+              <a:ext cx="1" cy="870373"/>
+            </a:xfrm>
+            <a:prstGeom prst="line">
+              <a:avLst/>
+            </a:prstGeom>
+            <a:ln w="82550">
+              <a:solidFill>
+                <a:srgbClr val="FFC000"/>
+              </a:solidFill>
+            </a:ln>
+          </p:spPr>
+          <p:style>
+            <a:lnRef idx="1">
+              <a:schemeClr val="accent1"/>
+            </a:lnRef>
+            <a:fillRef idx="0">
+              <a:schemeClr val="accent1"/>
+            </a:fillRef>
+            <a:effectRef idx="0">
+              <a:schemeClr val="accent1"/>
+            </a:effectRef>
+            <a:fontRef idx="minor">
+              <a:schemeClr val="tx1"/>
+            </a:fontRef>
+          </p:style>
+        </p:cxnSp>
+        <p:cxnSp>
+          <p:nvCxnSpPr>
+            <p:cNvPr id="15" name="Straight Connector 14">
+              <a:extLst>
+                <a:ext uri="{FF2B5EF4-FFF2-40B4-BE49-F238E27FC236}">
+                  <a16:creationId xmlns:a16="http://schemas.microsoft.com/office/drawing/2014/main" id="{5448919B-6CF5-4291-A4CC-B304C088D651}"/>
+                </a:ext>
+              </a:extLst>
+            </p:cNvPr>
+            <p:cNvCxnSpPr>
+              <a:cxnSpLocks/>
+            </p:cNvCxnSpPr>
+            <p:nvPr/>
+          </p:nvCxnSpPr>
+          <p:spPr>
+            <a:xfrm>
+              <a:off x="5490284" y="1992013"/>
+              <a:ext cx="1" cy="870373"/>
+            </a:xfrm>
+            <a:prstGeom prst="line">
+              <a:avLst/>
+            </a:prstGeom>
+            <a:ln w="82550">
+              <a:solidFill>
+                <a:srgbClr val="FFC000"/>
+              </a:solidFill>
+            </a:ln>
+          </p:spPr>
+          <p:style>
+            <a:lnRef idx="1">
+              <a:schemeClr val="accent1"/>
+            </a:lnRef>
+            <a:fillRef idx="0">
+              <a:schemeClr val="accent1"/>
+            </a:fillRef>
+            <a:effectRef idx="0">
+              <a:schemeClr val="accent1"/>
+            </a:effectRef>
+            <a:fontRef idx="minor">
+              <a:schemeClr val="tx1"/>
+            </a:fontRef>
+          </p:style>
+        </p:cxnSp>
+        <p:cxnSp>
+          <p:nvCxnSpPr>
+            <p:cNvPr id="16" name="Straight Connector 15">
+              <a:extLst>
+                <a:ext uri="{FF2B5EF4-FFF2-40B4-BE49-F238E27FC236}">
+                  <a16:creationId xmlns:a16="http://schemas.microsoft.com/office/drawing/2014/main" id="{6C989226-6F16-4CD5-8630-7E0D6D0BF1E6}"/>
+                </a:ext>
+              </a:extLst>
+            </p:cNvPr>
+            <p:cNvCxnSpPr>
+              <a:cxnSpLocks/>
+            </p:cNvCxnSpPr>
+            <p:nvPr/>
+          </p:nvCxnSpPr>
+          <p:spPr>
+            <a:xfrm>
+              <a:off x="5749122" y="1992013"/>
+              <a:ext cx="1" cy="870373"/>
+            </a:xfrm>
+            <a:prstGeom prst="line">
+              <a:avLst/>
+            </a:prstGeom>
+            <a:ln w="82550">
+              <a:solidFill>
+                <a:srgbClr val="FFC000"/>
+              </a:solidFill>
+            </a:ln>
+          </p:spPr>
+          <p:style>
+            <a:lnRef idx="1">
+              <a:schemeClr val="accent1"/>
+            </a:lnRef>
+            <a:fillRef idx="0">
+              <a:schemeClr val="accent1"/>
+            </a:fillRef>
+            <a:effectRef idx="0">
+              <a:schemeClr val="accent1"/>
+            </a:effectRef>
+            <a:fontRef idx="minor">
+              <a:schemeClr val="tx1"/>
+            </a:fontRef>
+          </p:style>
+        </p:cxnSp>
+        <p:cxnSp>
+          <p:nvCxnSpPr>
+            <p:cNvPr id="17" name="Straight Connector 16">
+              <a:extLst>
+                <a:ext uri="{FF2B5EF4-FFF2-40B4-BE49-F238E27FC236}">
+                  <a16:creationId xmlns:a16="http://schemas.microsoft.com/office/drawing/2014/main" id="{23311D54-EC03-4163-8DF7-5A956F817B9C}"/>
+                </a:ext>
+              </a:extLst>
+            </p:cNvPr>
+            <p:cNvCxnSpPr>
+              <a:cxnSpLocks/>
+            </p:cNvCxnSpPr>
+            <p:nvPr/>
+          </p:nvCxnSpPr>
+          <p:spPr>
+            <a:xfrm>
+              <a:off x="6007960" y="1992013"/>
+              <a:ext cx="1" cy="870373"/>
+            </a:xfrm>
+            <a:prstGeom prst="line">
+              <a:avLst/>
+            </a:prstGeom>
+            <a:ln w="82550">
+              <a:solidFill>
+                <a:srgbClr val="FFC000"/>
+              </a:solidFill>
+            </a:ln>
+          </p:spPr>
+          <p:style>
+            <a:lnRef idx="1">
+              <a:schemeClr val="accent1"/>
+            </a:lnRef>
+            <a:fillRef idx="0">
+              <a:schemeClr val="accent1"/>
+            </a:fillRef>
+            <a:effectRef idx="0">
+              <a:schemeClr val="accent1"/>
+            </a:effectRef>
+            <a:fontRef idx="minor">
+              <a:schemeClr val="tx1"/>
+            </a:fontRef>
+          </p:style>
+        </p:cxnSp>
+        <p:cxnSp>
+          <p:nvCxnSpPr>
+            <p:cNvPr id="18" name="Straight Connector 17">
+              <a:extLst>
+                <a:ext uri="{FF2B5EF4-FFF2-40B4-BE49-F238E27FC236}">
+                  <a16:creationId xmlns:a16="http://schemas.microsoft.com/office/drawing/2014/main" id="{575B56F9-4D47-4A8E-B9A7-0D024BE99B30}"/>
+                </a:ext>
+              </a:extLst>
+            </p:cNvPr>
+            <p:cNvCxnSpPr>
+              <a:cxnSpLocks/>
+            </p:cNvCxnSpPr>
+            <p:nvPr/>
+          </p:nvCxnSpPr>
+          <p:spPr>
+            <a:xfrm>
+              <a:off x="6266799" y="1992012"/>
+              <a:ext cx="1" cy="870373"/>
+            </a:xfrm>
+            <a:prstGeom prst="line">
+              <a:avLst/>
+            </a:prstGeom>
+            <a:ln w="82550">
+              <a:solidFill>
+                <a:srgbClr val="FFC000"/>
+              </a:solidFill>
+            </a:ln>
+          </p:spPr>
+          <p:style>
+            <a:lnRef idx="1">
+              <a:schemeClr val="accent1"/>
+            </a:lnRef>
+            <a:fillRef idx="0">
+              <a:schemeClr val="accent1"/>
+            </a:fillRef>
+            <a:effectRef idx="0">
+              <a:schemeClr val="accent1"/>
+            </a:effectRef>
+            <a:fontRef idx="minor">
+              <a:schemeClr val="tx1"/>
+            </a:fontRef>
+          </p:style>
+        </p:cxnSp>
+        <p:sp>
+          <p:nvSpPr>
+            <p:cNvPr id="21" name="Rectangle 20">
+              <a:extLst>
+                <a:ext uri="{FF2B5EF4-FFF2-40B4-BE49-F238E27FC236}">
+                  <a16:creationId xmlns:a16="http://schemas.microsoft.com/office/drawing/2014/main" id="{3AABA8CC-0170-4B13-9CAA-E2096FD1827B}"/>
+                </a:ext>
+              </a:extLst>
+            </p:cNvPr>
+            <p:cNvSpPr/>
+            <p:nvPr/>
+          </p:nvSpPr>
+          <p:spPr>
+            <a:xfrm>
+              <a:off x="5002894" y="2865376"/>
+              <a:ext cx="670593" cy="181025"/>
+            </a:xfrm>
+            <a:prstGeom prst="rect">
+              <a:avLst/>
+            </a:prstGeom>
+          </p:spPr>
+          <p:style>
+            <a:lnRef idx="2">
+              <a:schemeClr val="accent1">
+                <a:shade val="50000"/>
+              </a:schemeClr>
+            </a:lnRef>
+            <a:fillRef idx="1">
+              <a:schemeClr val="accent1"/>
+            </a:fillRef>
+            <a:effectRef idx="0">
+              <a:schemeClr val="accent1"/>
+            </a:effectRef>
+            <a:fontRef idx="minor">
+              <a:schemeClr val="lt1"/>
+            </a:fontRef>
+          </p:style>
+          <p:txBody>
+            <a:bodyPr rtlCol="0" anchor="ctr"/>
+            <a:lstStyle/>
+            <a:p>
+              <a:pPr algn="ctr"/>
+              <a:endParaRPr lang="en-SE"/>
+            </a:p>
+          </p:txBody>
+        </p:sp>
+        <p:sp>
+          <p:nvSpPr>
+            <p:cNvPr id="24" name="TextBox 23">
+              <a:extLst>
+                <a:ext uri="{FF2B5EF4-FFF2-40B4-BE49-F238E27FC236}">
+                  <a16:creationId xmlns:a16="http://schemas.microsoft.com/office/drawing/2014/main" id="{2AB833E5-D999-49E9-B0A2-D40F514CE571}"/>
+                </a:ext>
+              </a:extLst>
+            </p:cNvPr>
+            <p:cNvSpPr txBox="1"/>
+            <p:nvPr/>
+          </p:nvSpPr>
+          <p:spPr>
+            <a:xfrm rot="16200000">
+              <a:off x="4279206" y="1743950"/>
+              <a:ext cx="394660" cy="246221"/>
+            </a:xfrm>
+            <a:prstGeom prst="rect">
+              <a:avLst/>
+            </a:prstGeom>
+            <a:noFill/>
+          </p:spPr>
+          <p:txBody>
+            <a:bodyPr wrap="none" rtlCol="0">
+              <a:spAutoFit/>
+            </a:bodyPr>
+            <a:lstStyle/>
+            <a:p>
+              <a:r>
+                <a:rPr lang="en-SE" sz="1000" dirty="0"/>
+                <a:t>DTR</a:t>
+              </a:r>
+            </a:p>
+          </p:txBody>
+        </p:sp>
+        <p:sp>
+          <p:nvSpPr>
+            <p:cNvPr id="31" name="TextBox 30">
+              <a:extLst>
+                <a:ext uri="{FF2B5EF4-FFF2-40B4-BE49-F238E27FC236}">
+                  <a16:creationId xmlns:a16="http://schemas.microsoft.com/office/drawing/2014/main" id="{7FA4CCE2-18F5-46C9-82F0-23D94DA41E90}"/>
+                </a:ext>
+              </a:extLst>
+            </p:cNvPr>
+            <p:cNvSpPr txBox="1"/>
+            <p:nvPr/>
+          </p:nvSpPr>
+          <p:spPr>
+            <a:xfrm rot="16200000">
+              <a:off x="4537130" y="1747156"/>
+              <a:ext cx="388248" cy="246221"/>
+            </a:xfrm>
+            <a:prstGeom prst="rect">
+              <a:avLst/>
+            </a:prstGeom>
+            <a:noFill/>
+          </p:spPr>
+          <p:txBody>
+            <a:bodyPr wrap="none" rtlCol="0">
+              <a:spAutoFit/>
+            </a:bodyPr>
+            <a:lstStyle/>
+            <a:p>
+              <a:r>
+                <a:rPr lang="en-SE" sz="1000" dirty="0" err="1"/>
+                <a:t>RxD</a:t>
+              </a:r>
+              <a:endParaRPr lang="en-SE" sz="1000" dirty="0"/>
+            </a:p>
+          </p:txBody>
+        </p:sp>
+        <p:sp>
+          <p:nvSpPr>
+            <p:cNvPr id="32" name="TextBox 31">
+              <a:extLst>
+                <a:ext uri="{FF2B5EF4-FFF2-40B4-BE49-F238E27FC236}">
+                  <a16:creationId xmlns:a16="http://schemas.microsoft.com/office/drawing/2014/main" id="{09C4EE8A-9023-4CED-B633-05835DB2DF3B}"/>
+                </a:ext>
+              </a:extLst>
+            </p:cNvPr>
+            <p:cNvSpPr txBox="1"/>
+            <p:nvPr/>
+          </p:nvSpPr>
+          <p:spPr>
+            <a:xfrm rot="16200000">
+              <a:off x="4799863" y="1755171"/>
+              <a:ext cx="372218" cy="246221"/>
+            </a:xfrm>
+            <a:prstGeom prst="rect">
+              <a:avLst/>
+            </a:prstGeom>
+            <a:noFill/>
+          </p:spPr>
+          <p:txBody>
+            <a:bodyPr wrap="none" rtlCol="0">
+              <a:spAutoFit/>
+            </a:bodyPr>
+            <a:lstStyle/>
+            <a:p>
+              <a:r>
+                <a:rPr lang="en-SE" sz="1000" dirty="0" err="1"/>
+                <a:t>RxT</a:t>
+              </a:r>
+              <a:endParaRPr lang="en-SE" sz="1000" dirty="0"/>
+            </a:p>
+          </p:txBody>
+        </p:sp>
+        <p:sp>
+          <p:nvSpPr>
+            <p:cNvPr id="33" name="TextBox 32">
+              <a:extLst>
+                <a:ext uri="{FF2B5EF4-FFF2-40B4-BE49-F238E27FC236}">
+                  <a16:creationId xmlns:a16="http://schemas.microsoft.com/office/drawing/2014/main" id="{CC02D746-AC9E-4657-B94D-2362CAD109A9}"/>
+                </a:ext>
+              </a:extLst>
+            </p:cNvPr>
+            <p:cNvSpPr txBox="1"/>
+            <p:nvPr/>
+          </p:nvSpPr>
+          <p:spPr>
+            <a:xfrm rot="16200000">
+              <a:off x="5043360" y="1743950"/>
+              <a:ext cx="394660" cy="246221"/>
+            </a:xfrm>
+            <a:prstGeom prst="rect">
+              <a:avLst/>
+            </a:prstGeom>
+            <a:noFill/>
+          </p:spPr>
+          <p:txBody>
+            <a:bodyPr wrap="none" rtlCol="0">
+              <a:spAutoFit/>
+            </a:bodyPr>
+            <a:lstStyle/>
+            <a:p>
+              <a:r>
+                <a:rPr lang="en-SE" sz="1000" dirty="0"/>
+                <a:t>VCC</a:t>
+              </a:r>
+            </a:p>
+          </p:txBody>
+        </p:sp>
+        <p:sp>
+          <p:nvSpPr>
+            <p:cNvPr id="34" name="TextBox 33">
+              <a:extLst>
+                <a:ext uri="{FF2B5EF4-FFF2-40B4-BE49-F238E27FC236}">
+                  <a16:creationId xmlns:a16="http://schemas.microsoft.com/office/drawing/2014/main" id="{1FEDD6EB-2922-49FD-BD2B-F3B9E97025A4}"/>
+                </a:ext>
+              </a:extLst>
+            </p:cNvPr>
+            <p:cNvSpPr txBox="1"/>
+            <p:nvPr/>
+          </p:nvSpPr>
+          <p:spPr>
+            <a:xfrm rot="16200000">
+              <a:off x="5307696" y="1753568"/>
+              <a:ext cx="375424" cy="246221"/>
+            </a:xfrm>
+            <a:prstGeom prst="rect">
+              <a:avLst/>
+            </a:prstGeom>
+            <a:noFill/>
+          </p:spPr>
+          <p:txBody>
+            <a:bodyPr wrap="none" rtlCol="0">
+              <a:spAutoFit/>
+            </a:bodyPr>
+            <a:lstStyle/>
+            <a:p>
+              <a:r>
+                <a:rPr lang="en-SE" sz="1000" dirty="0"/>
+                <a:t>CTS</a:t>
+              </a:r>
+            </a:p>
+          </p:txBody>
+        </p:sp>
+        <p:sp>
+          <p:nvSpPr>
+            <p:cNvPr id="35" name="TextBox 34">
+              <a:extLst>
+                <a:ext uri="{FF2B5EF4-FFF2-40B4-BE49-F238E27FC236}">
+                  <a16:creationId xmlns:a16="http://schemas.microsoft.com/office/drawing/2014/main" id="{94CB35ED-04CC-4BC8-9B32-E351ACA98EC6}"/>
+                </a:ext>
+              </a:extLst>
+            </p:cNvPr>
+            <p:cNvSpPr txBox="1"/>
+            <p:nvPr/>
+          </p:nvSpPr>
+          <p:spPr>
+            <a:xfrm rot="16200000">
+              <a:off x="5536766" y="1727920"/>
+              <a:ext cx="426720" cy="246221"/>
+            </a:xfrm>
+            <a:prstGeom prst="rect">
+              <a:avLst/>
+            </a:prstGeom>
+            <a:noFill/>
+          </p:spPr>
+          <p:txBody>
+            <a:bodyPr wrap="none" rtlCol="0">
+              <a:spAutoFit/>
+            </a:bodyPr>
+            <a:lstStyle/>
+            <a:p>
+              <a:r>
+                <a:rPr lang="en-SE" sz="1000" dirty="0"/>
+                <a:t>GND</a:t>
+              </a:r>
+            </a:p>
+          </p:txBody>
+        </p:sp>
+        <p:sp>
+          <p:nvSpPr>
+            <p:cNvPr id="36" name="TextBox 35">
+              <a:extLst>
+                <a:ext uri="{FF2B5EF4-FFF2-40B4-BE49-F238E27FC236}">
+                  <a16:creationId xmlns:a16="http://schemas.microsoft.com/office/drawing/2014/main" id="{2DED9178-B90D-4D74-AFEF-67E52866A9E9}"/>
+                </a:ext>
+              </a:extLst>
+            </p:cNvPr>
+            <p:cNvSpPr txBox="1"/>
+            <p:nvPr/>
+          </p:nvSpPr>
+          <p:spPr>
+            <a:xfrm rot="16200000">
+              <a:off x="5768241" y="1704677"/>
+              <a:ext cx="473206" cy="246221"/>
+            </a:xfrm>
+            <a:prstGeom prst="rect">
+              <a:avLst/>
+            </a:prstGeom>
+            <a:noFill/>
+          </p:spPr>
+          <p:txBody>
+            <a:bodyPr wrap="none" rtlCol="0">
+              <a:spAutoFit/>
+            </a:bodyPr>
+            <a:lstStyle/>
+            <a:p>
+              <a:r>
+                <a:rPr lang="en-SE" sz="1000" dirty="0"/>
+                <a:t>DATA</a:t>
+              </a:r>
+            </a:p>
+          </p:txBody>
+        </p:sp>
+        <p:sp>
+          <p:nvSpPr>
+            <p:cNvPr id="37" name="TextBox 36">
+              <a:extLst>
+                <a:ext uri="{FF2B5EF4-FFF2-40B4-BE49-F238E27FC236}">
+                  <a16:creationId xmlns:a16="http://schemas.microsoft.com/office/drawing/2014/main" id="{EC514524-257B-4EE8-967C-77B57294610B}"/>
+                </a:ext>
+              </a:extLst>
+            </p:cNvPr>
+            <p:cNvSpPr txBox="1"/>
+            <p:nvPr/>
+          </p:nvSpPr>
+          <p:spPr>
+            <a:xfrm rot="16200000">
+              <a:off x="6062230" y="1743950"/>
+              <a:ext cx="394660" cy="246221"/>
+            </a:xfrm>
+            <a:prstGeom prst="rect">
+              <a:avLst/>
+            </a:prstGeom>
+            <a:noFill/>
+          </p:spPr>
+          <p:txBody>
+            <a:bodyPr wrap="none" rtlCol="0">
+              <a:spAutoFit/>
+            </a:bodyPr>
+            <a:lstStyle/>
+            <a:p>
+              <a:r>
+                <a:rPr lang="en-SE" sz="1000" dirty="0"/>
+                <a:t>VCC</a:t>
+              </a:r>
+            </a:p>
+          </p:txBody>
+        </p:sp>
+        <p:sp>
+          <p:nvSpPr>
+            <p:cNvPr id="82" name="TextBox 81">
+              <a:extLst>
+                <a:ext uri="{FF2B5EF4-FFF2-40B4-BE49-F238E27FC236}">
+                  <a16:creationId xmlns:a16="http://schemas.microsoft.com/office/drawing/2014/main" id="{99B1ABE5-6FF2-44E3-8CDB-D57C30DFC70E}"/>
+                </a:ext>
+              </a:extLst>
+            </p:cNvPr>
+            <p:cNvSpPr txBox="1"/>
+            <p:nvPr/>
+          </p:nvSpPr>
+          <p:spPr>
+            <a:xfrm>
+              <a:off x="6395282" y="2279048"/>
+              <a:ext cx="2136739" cy="369332"/>
+            </a:xfrm>
+            <a:prstGeom prst="rect">
+              <a:avLst/>
+            </a:prstGeom>
+            <a:noFill/>
+          </p:spPr>
+          <p:txBody>
+            <a:bodyPr wrap="none" rtlCol="0">
+              <a:spAutoFit/>
+            </a:bodyPr>
+            <a:lstStyle/>
+            <a:p>
+              <a:r>
+                <a:rPr lang="en-SE" dirty="0"/>
+                <a:t>View from cable side</a:t>
+              </a:r>
+            </a:p>
+          </p:txBody>
+        </p:sp>
+      </p:grpSp>
+      <p:sp>
+        <p:nvSpPr>
+          <p:cNvPr id="83" name="TextBox 82">
+            <a:extLst>
+              <a:ext uri="{FF2B5EF4-FFF2-40B4-BE49-F238E27FC236}">
+                <a16:creationId xmlns:a16="http://schemas.microsoft.com/office/drawing/2014/main" id="{9C9C3467-B0A3-48BC-82F7-B35E87F04C34}"/>
+              </a:ext>
+            </a:extLst>
+          </p:cNvPr>
+          <p:cNvSpPr txBox="1"/>
+          <p:nvPr/>
+        </p:nvSpPr>
+        <p:spPr>
+          <a:xfrm rot="16200000">
+            <a:off x="4012289" y="3219820"/>
+            <a:ext cx="731290" cy="246221"/>
+          </a:xfrm>
+          <a:prstGeom prst="rect">
+            <a:avLst/>
+          </a:prstGeom>
+          <a:noFill/>
+        </p:spPr>
+        <p:txBody>
+          <a:bodyPr wrap="none" rtlCol="0">
+            <a:spAutoFit/>
+          </a:bodyPr>
+          <a:lstStyle/>
+          <a:p>
+            <a:r>
+              <a:rPr lang="en-SE" sz="1000" dirty="0"/>
+              <a:t>W/Orange</a:t>
+            </a:r>
+          </a:p>
+        </p:txBody>
+      </p:sp>
+      <p:sp>
+        <p:nvSpPr>
+          <p:cNvPr id="84" name="TextBox 83">
+            <a:extLst>
+              <a:ext uri="{FF2B5EF4-FFF2-40B4-BE49-F238E27FC236}">
+                <a16:creationId xmlns:a16="http://schemas.microsoft.com/office/drawing/2014/main" id="{6A6DC4DC-C063-43ED-B5B0-2420BFCFEAD3}"/>
+              </a:ext>
+            </a:extLst>
+          </p:cNvPr>
+          <p:cNvSpPr txBox="1"/>
+          <p:nvPr/>
+        </p:nvSpPr>
+        <p:spPr>
+          <a:xfrm rot="16200000">
+            <a:off x="4338628" y="3149287"/>
+            <a:ext cx="567784" cy="246221"/>
+          </a:xfrm>
+          <a:prstGeom prst="rect">
+            <a:avLst/>
+          </a:prstGeom>
+          <a:noFill/>
+        </p:spPr>
+        <p:txBody>
+          <a:bodyPr wrap="none" rtlCol="0">
+            <a:spAutoFit/>
+          </a:bodyPr>
+          <a:lstStyle/>
+          <a:p>
+            <a:r>
+              <a:rPr lang="en-SE" sz="1000" dirty="0"/>
+              <a:t>Orange</a:t>
+            </a:r>
+          </a:p>
+        </p:txBody>
+      </p:sp>
+      <p:sp>
+        <p:nvSpPr>
+          <p:cNvPr id="85" name="TextBox 84">
+            <a:extLst>
+              <a:ext uri="{FF2B5EF4-FFF2-40B4-BE49-F238E27FC236}">
+                <a16:creationId xmlns:a16="http://schemas.microsoft.com/office/drawing/2014/main" id="{4DB5FED6-B41F-464C-9B66-78B0D060D0C5}"/>
+              </a:ext>
+            </a:extLst>
+          </p:cNvPr>
+          <p:cNvSpPr txBox="1"/>
+          <p:nvPr/>
+        </p:nvSpPr>
+        <p:spPr>
+          <a:xfrm rot="16200000">
+            <a:off x="4546297" y="3192904"/>
+            <a:ext cx="668773" cy="246221"/>
+          </a:xfrm>
+          <a:prstGeom prst="rect">
+            <a:avLst/>
+          </a:prstGeom>
+          <a:noFill/>
+        </p:spPr>
+        <p:txBody>
+          <a:bodyPr wrap="none" rtlCol="0">
+            <a:spAutoFit/>
+          </a:bodyPr>
+          <a:lstStyle/>
+          <a:p>
+            <a:r>
+              <a:rPr lang="en-SE" sz="1000" dirty="0"/>
+              <a:t>W/Green</a:t>
+            </a:r>
+          </a:p>
+        </p:txBody>
+      </p:sp>
+      <p:sp>
+        <p:nvSpPr>
+          <p:cNvPr id="86" name="TextBox 85">
+            <a:extLst>
+              <a:ext uri="{FF2B5EF4-FFF2-40B4-BE49-F238E27FC236}">
+                <a16:creationId xmlns:a16="http://schemas.microsoft.com/office/drawing/2014/main" id="{AD57AF20-A72E-4378-81EA-7F3F15EC80D2}"/>
+              </a:ext>
+            </a:extLst>
+          </p:cNvPr>
+          <p:cNvSpPr txBox="1"/>
+          <p:nvPr/>
+        </p:nvSpPr>
+        <p:spPr>
+          <a:xfrm rot="16200000">
+            <a:off x="4932305" y="3103892"/>
+            <a:ext cx="415498" cy="246221"/>
+          </a:xfrm>
+          <a:prstGeom prst="rect">
+            <a:avLst/>
+          </a:prstGeom>
+          <a:noFill/>
+        </p:spPr>
+        <p:txBody>
+          <a:bodyPr wrap="none" rtlCol="0">
+            <a:spAutoFit/>
+          </a:bodyPr>
+          <a:lstStyle/>
+          <a:p>
+            <a:r>
+              <a:rPr lang="en-SE" sz="1000" dirty="0"/>
+              <a:t>Blue</a:t>
+            </a:r>
+          </a:p>
+        </p:txBody>
+      </p:sp>
+      <p:sp>
+        <p:nvSpPr>
+          <p:cNvPr id="88" name="TextBox 87">
+            <a:extLst>
+              <a:ext uri="{FF2B5EF4-FFF2-40B4-BE49-F238E27FC236}">
+                <a16:creationId xmlns:a16="http://schemas.microsoft.com/office/drawing/2014/main" id="{0682E2EA-A949-4E0D-B50C-A5EEB57CCACA}"/>
+              </a:ext>
+            </a:extLst>
+          </p:cNvPr>
+          <p:cNvSpPr txBox="1"/>
+          <p:nvPr/>
+        </p:nvSpPr>
+        <p:spPr>
+          <a:xfrm rot="16200000">
+            <a:off x="5411717" y="3148777"/>
+            <a:ext cx="505267" cy="246221"/>
+          </a:xfrm>
+          <a:prstGeom prst="rect">
+            <a:avLst/>
+          </a:prstGeom>
+          <a:noFill/>
+        </p:spPr>
+        <p:txBody>
+          <a:bodyPr wrap="none" rtlCol="0">
+            <a:spAutoFit/>
+          </a:bodyPr>
+          <a:lstStyle/>
+          <a:p>
+            <a:r>
+              <a:rPr lang="en-SE" sz="1000" dirty="0"/>
+              <a:t>Green</a:t>
+            </a:r>
+          </a:p>
+        </p:txBody>
+      </p:sp>
+      <p:sp>
+        <p:nvSpPr>
+          <p:cNvPr id="89" name="TextBox 88">
+            <a:extLst>
+              <a:ext uri="{FF2B5EF4-FFF2-40B4-BE49-F238E27FC236}">
+                <a16:creationId xmlns:a16="http://schemas.microsoft.com/office/drawing/2014/main" id="{81478472-BD3A-42B5-AF05-B332EB4A190A}"/>
+              </a:ext>
+            </a:extLst>
+          </p:cNvPr>
+          <p:cNvSpPr txBox="1"/>
+          <p:nvPr/>
+        </p:nvSpPr>
+        <p:spPr>
+          <a:xfrm rot="16200000">
+            <a:off x="5893336" y="3159196"/>
+            <a:ext cx="526106" cy="246221"/>
+          </a:xfrm>
+          <a:prstGeom prst="rect">
+            <a:avLst/>
+          </a:prstGeom>
+          <a:noFill/>
+        </p:spPr>
+        <p:txBody>
+          <a:bodyPr wrap="none" rtlCol="0">
+            <a:spAutoFit/>
+          </a:bodyPr>
+          <a:lstStyle/>
+          <a:p>
+            <a:r>
+              <a:rPr lang="en-SE" sz="1000" dirty="0"/>
+              <a:t>Brown</a:t>
+            </a:r>
+          </a:p>
+        </p:txBody>
+      </p:sp>
+      <p:sp>
+        <p:nvSpPr>
+          <p:cNvPr id="90" name="TextBox 89">
+            <a:extLst>
+              <a:ext uri="{FF2B5EF4-FFF2-40B4-BE49-F238E27FC236}">
+                <a16:creationId xmlns:a16="http://schemas.microsoft.com/office/drawing/2014/main" id="{210C6DFA-93F4-4765-A9CB-5E6C5DF9DBB3}"/>
+              </a:ext>
+            </a:extLst>
+          </p:cNvPr>
+          <p:cNvSpPr txBox="1"/>
+          <p:nvPr/>
+        </p:nvSpPr>
+        <p:spPr>
+          <a:xfrm rot="16200000">
+            <a:off x="5559206" y="3240949"/>
+            <a:ext cx="689612" cy="246221"/>
+          </a:xfrm>
+          <a:prstGeom prst="rect">
+            <a:avLst/>
+          </a:prstGeom>
+          <a:noFill/>
+        </p:spPr>
+        <p:txBody>
+          <a:bodyPr wrap="none" rtlCol="0">
+            <a:spAutoFit/>
+          </a:bodyPr>
+          <a:lstStyle/>
+          <a:p>
+            <a:r>
+              <a:rPr lang="en-SE" sz="1000" dirty="0"/>
+              <a:t>W/Brown</a:t>
+            </a:r>
+          </a:p>
+        </p:txBody>
+      </p:sp>
+      <p:sp>
+        <p:nvSpPr>
+          <p:cNvPr id="91" name="TextBox 90">
+            <a:extLst>
+              <a:ext uri="{FF2B5EF4-FFF2-40B4-BE49-F238E27FC236}">
+                <a16:creationId xmlns:a16="http://schemas.microsoft.com/office/drawing/2014/main" id="{CFFBD8E3-BF06-43C2-8AE2-C7787D2B5659}"/>
+              </a:ext>
+            </a:extLst>
+          </p:cNvPr>
+          <p:cNvSpPr txBox="1"/>
+          <p:nvPr/>
+        </p:nvSpPr>
+        <p:spPr>
+          <a:xfrm rot="16200000">
+            <a:off x="5121300" y="3151983"/>
+            <a:ext cx="511679" cy="246221"/>
+          </a:xfrm>
+          <a:prstGeom prst="rect">
+            <a:avLst/>
+          </a:prstGeom>
+          <a:noFill/>
+        </p:spPr>
+        <p:txBody>
+          <a:bodyPr wrap="none" rtlCol="0">
+            <a:spAutoFit/>
+          </a:bodyPr>
+          <a:lstStyle/>
+          <a:p>
+            <a:r>
+              <a:rPr lang="en-SE" sz="1000" dirty="0"/>
+              <a:t>W/</a:t>
+            </a:r>
+            <a:r>
+              <a:rPr lang="en-SE" sz="1000" dirty="0" err="1"/>
+              <a:t>Ble</a:t>
+            </a:r>
+            <a:endParaRPr lang="en-SE" sz="1000" dirty="0"/>
+          </a:p>
+        </p:txBody>
+      </p:sp>
+      <p:cxnSp>
+        <p:nvCxnSpPr>
+          <p:cNvPr id="110" name="Straight Connector 109">
+            <a:extLst>
+              <a:ext uri="{FF2B5EF4-FFF2-40B4-BE49-F238E27FC236}">
+                <a16:creationId xmlns:a16="http://schemas.microsoft.com/office/drawing/2014/main" id="{8A421FC0-B21C-486A-B587-188C6EF3AB91}"/>
+              </a:ext>
+            </a:extLst>
+          </p:cNvPr>
+          <p:cNvCxnSpPr>
+            <a:cxnSpLocks/>
+          </p:cNvCxnSpPr>
+          <p:nvPr/>
+        </p:nvCxnSpPr>
+        <p:spPr>
+          <a:xfrm>
+            <a:off x="5751781" y="2188910"/>
+            <a:ext cx="0" cy="3304423"/>
+          </a:xfrm>
+          <a:prstGeom prst="line">
+            <a:avLst/>
+          </a:prstGeom>
+        </p:spPr>
+        <p:style>
+          <a:lnRef idx="1">
+            <a:schemeClr val="accent1"/>
+          </a:lnRef>
+          <a:fillRef idx="0">
+            <a:schemeClr val="accent1"/>
+          </a:fillRef>
+          <a:effectRef idx="0">
+            <a:schemeClr val="accent1"/>
+          </a:effectRef>
+          <a:fontRef idx="minor">
+            <a:schemeClr val="tx1"/>
+          </a:fontRef>
+        </p:style>
+      </p:cxnSp>
+    </p:spTree>
+    <p:extLst>
+      <p:ext uri="{BB962C8B-B14F-4D97-AF65-F5344CB8AC3E}">
+        <p14:creationId xmlns:p14="http://schemas.microsoft.com/office/powerpoint/2010/main" val="161329444"/>
+      </p:ext>
+    </p:extLst>
+  </p:cSld>
+  <p:clrMapOvr>
+    <a:masterClrMapping/>
+  </p:clrMapOvr>
+</p:sld>
+</file>
+
 <file path=ppt/theme/theme1.xml><?xml version="1.0" encoding="utf-8"?>
 <a:theme xmlns:a="http://schemas.openxmlformats.org/drawingml/2006/main" name="Office Theme">
   <a:themeElements>

</xml_diff>